<commit_message>
updates to analysis post jose meeting
</commit_message>
<xml_diff>
--- a/analysis2/figs/at_home_p5_summary.pptx
+++ b/analysis2/figs/at_home_p5_summary.pptx
@@ -4,6 +4,9 @@
   <p:sldMasterIdLst>
     <p:sldMasterId id="2147483648" r:id="rId1"/>
   </p:sldMasterIdLst>
+  <p:notesMasterIdLst>
+    <p:notesMasterId r:id="rId13"/>
+  </p:notesMasterIdLst>
   <p:sldIdLst>
     <p:sldId id="256" r:id="rId2"/>
     <p:sldId id="257" r:id="rId3"/>
@@ -11,7 +14,11 @@
     <p:sldId id="260" r:id="rId5"/>
     <p:sldId id="258" r:id="rId6"/>
     <p:sldId id="261" r:id="rId7"/>
-    <p:sldId id="262" r:id="rId8"/>
+    <p:sldId id="265" r:id="rId8"/>
+    <p:sldId id="262" r:id="rId9"/>
+    <p:sldId id="263" r:id="rId10"/>
+    <p:sldId id="264" r:id="rId11"/>
+    <p:sldId id="266" r:id="rId12"/>
   </p:sldIdLst>
   <p:sldSz cx="12192000" cy="6858000"/>
   <p:notesSz cx="6858000" cy="9144000"/>
@@ -110,6 +117,11 @@
       </a:defRPr>
     </a:lvl9pPr>
   </p:defaultTextStyle>
+  <p:extLst>
+    <p:ext uri="{EFAFB233-063F-42B5-8137-9DF3F51BA10A}">
+      <p15:sldGuideLst xmlns:p15="http://schemas.microsoft.com/office/powerpoint/2012/main"/>
+    </p:ext>
+  </p:extLst>
 </p:presentation>
 </file>
 
@@ -123,6 +135,793 @@
     </p:extLst>
   </p:cmAuthor>
 </p:cmAuthorLst>
+</file>
+
+<file path=ppt/notesMasters/notesMaster1.xml><?xml version="1.0" encoding="utf-8"?>
+<p:notesMaster xmlns:a="http://schemas.openxmlformats.org/drawingml/2006/main" xmlns:r="http://schemas.openxmlformats.org/officeDocument/2006/relationships" xmlns:p="http://schemas.openxmlformats.org/presentationml/2006/main">
+  <p:cSld>
+    <p:bg>
+      <p:bgRef idx="1001">
+        <a:schemeClr val="bg1"/>
+      </p:bgRef>
+    </p:bg>
+    <p:spTree>
+      <p:nvGrpSpPr>
+        <p:cNvPr id="1" name=""/>
+        <p:cNvGrpSpPr/>
+        <p:nvPr/>
+      </p:nvGrpSpPr>
+      <p:grpSpPr>
+        <a:xfrm>
+          <a:off x="0" y="0"/>
+          <a:ext cx="0" cy="0"/>
+          <a:chOff x="0" y="0"/>
+          <a:chExt cx="0" cy="0"/>
+        </a:xfrm>
+      </p:grpSpPr>
+      <p:sp>
+        <p:nvSpPr>
+          <p:cNvPr id="2" name="Header Placeholder 1"/>
+          <p:cNvSpPr>
+            <a:spLocks noGrp="1"/>
+          </p:cNvSpPr>
+          <p:nvPr>
+            <p:ph type="hdr" sz="quarter"/>
+          </p:nvPr>
+        </p:nvSpPr>
+        <p:spPr>
+          <a:xfrm>
+            <a:off x="0" y="0"/>
+            <a:ext cx="2971800" cy="458788"/>
+          </a:xfrm>
+          <a:prstGeom prst="rect">
+            <a:avLst/>
+          </a:prstGeom>
+        </p:spPr>
+        <p:txBody>
+          <a:bodyPr vert="horz" lIns="91440" tIns="45720" rIns="91440" bIns="45720" rtlCol="0"/>
+          <a:lstStyle>
+            <a:lvl1pPr algn="l">
+              <a:defRPr sz="1200"/>
+            </a:lvl1pPr>
+          </a:lstStyle>
+          <a:p>
+            <a:endParaRPr lang="en-US"/>
+          </a:p>
+        </p:txBody>
+      </p:sp>
+      <p:sp>
+        <p:nvSpPr>
+          <p:cNvPr id="3" name="Date Placeholder 2"/>
+          <p:cNvSpPr>
+            <a:spLocks noGrp="1"/>
+          </p:cNvSpPr>
+          <p:nvPr>
+            <p:ph type="dt" idx="1"/>
+          </p:nvPr>
+        </p:nvSpPr>
+        <p:spPr>
+          <a:xfrm>
+            <a:off x="3884613" y="0"/>
+            <a:ext cx="2971800" cy="458788"/>
+          </a:xfrm>
+          <a:prstGeom prst="rect">
+            <a:avLst/>
+          </a:prstGeom>
+        </p:spPr>
+        <p:txBody>
+          <a:bodyPr vert="horz" lIns="91440" tIns="45720" rIns="91440" bIns="45720" rtlCol="0"/>
+          <a:lstStyle>
+            <a:lvl1pPr algn="r">
+              <a:defRPr sz="1200"/>
+            </a:lvl1pPr>
+          </a:lstStyle>
+          <a:p>
+            <a:fld id="{28203E9A-899C-40AF-BD3B-5281BF0B6227}" type="datetimeFigureOut">
+              <a:rPr lang="en-US" smtClean="0"/>
+              <a:t>3/6/2017</a:t>
+            </a:fld>
+            <a:endParaRPr lang="en-US"/>
+          </a:p>
+        </p:txBody>
+      </p:sp>
+      <p:sp>
+        <p:nvSpPr>
+          <p:cNvPr id="4" name="Slide Image Placeholder 3"/>
+          <p:cNvSpPr>
+            <a:spLocks noGrp="1" noRot="1" noChangeAspect="1"/>
+          </p:cNvSpPr>
+          <p:nvPr>
+            <p:ph type="sldImg" idx="2"/>
+          </p:nvPr>
+        </p:nvSpPr>
+        <p:spPr>
+          <a:xfrm>
+            <a:off x="685800" y="1143000"/>
+            <a:ext cx="5486400" cy="3086100"/>
+          </a:xfrm>
+          <a:prstGeom prst="rect">
+            <a:avLst/>
+          </a:prstGeom>
+          <a:noFill/>
+          <a:ln w="12700">
+            <a:solidFill>
+              <a:prstClr val="black"/>
+            </a:solidFill>
+          </a:ln>
+        </p:spPr>
+        <p:txBody>
+          <a:bodyPr vert="horz" lIns="91440" tIns="45720" rIns="91440" bIns="45720" rtlCol="0" anchor="ctr"/>
+          <a:lstStyle/>
+          <a:p>
+            <a:endParaRPr lang="en-US"/>
+          </a:p>
+        </p:txBody>
+      </p:sp>
+      <p:sp>
+        <p:nvSpPr>
+          <p:cNvPr id="5" name="Notes Placeholder 4"/>
+          <p:cNvSpPr>
+            <a:spLocks noGrp="1"/>
+          </p:cNvSpPr>
+          <p:nvPr>
+            <p:ph type="body" sz="quarter" idx="3"/>
+          </p:nvPr>
+        </p:nvSpPr>
+        <p:spPr>
+          <a:xfrm>
+            <a:off x="685800" y="4400550"/>
+            <a:ext cx="5486400" cy="3600450"/>
+          </a:xfrm>
+          <a:prstGeom prst="rect">
+            <a:avLst/>
+          </a:prstGeom>
+        </p:spPr>
+        <p:txBody>
+          <a:bodyPr vert="horz" lIns="91440" tIns="45720" rIns="91440" bIns="45720" rtlCol="0"/>
+          <a:lstStyle/>
+          <a:p>
+            <a:pPr lvl="0"/>
+            <a:r>
+              <a:rPr lang="en-US"/>
+              <a:t>Edit Master text styles</a:t>
+            </a:r>
+          </a:p>
+          <a:p>
+            <a:pPr lvl="1"/>
+            <a:r>
+              <a:rPr lang="en-US"/>
+              <a:t>Second level</a:t>
+            </a:r>
+          </a:p>
+          <a:p>
+            <a:pPr lvl="2"/>
+            <a:r>
+              <a:rPr lang="en-US"/>
+              <a:t>Third level</a:t>
+            </a:r>
+          </a:p>
+          <a:p>
+            <a:pPr lvl="3"/>
+            <a:r>
+              <a:rPr lang="en-US"/>
+              <a:t>Fourth level</a:t>
+            </a:r>
+          </a:p>
+          <a:p>
+            <a:pPr lvl="4"/>
+            <a:r>
+              <a:rPr lang="en-US"/>
+              <a:t>Fifth level</a:t>
+            </a:r>
+            <a:endParaRPr lang="en-US"/>
+          </a:p>
+        </p:txBody>
+      </p:sp>
+      <p:sp>
+        <p:nvSpPr>
+          <p:cNvPr id="6" name="Footer Placeholder 5"/>
+          <p:cNvSpPr>
+            <a:spLocks noGrp="1"/>
+          </p:cNvSpPr>
+          <p:nvPr>
+            <p:ph type="ftr" sz="quarter" idx="4"/>
+          </p:nvPr>
+        </p:nvSpPr>
+        <p:spPr>
+          <a:xfrm>
+            <a:off x="0" y="8685213"/>
+            <a:ext cx="2971800" cy="458787"/>
+          </a:xfrm>
+          <a:prstGeom prst="rect">
+            <a:avLst/>
+          </a:prstGeom>
+        </p:spPr>
+        <p:txBody>
+          <a:bodyPr vert="horz" lIns="91440" tIns="45720" rIns="91440" bIns="45720" rtlCol="0" anchor="b"/>
+          <a:lstStyle>
+            <a:lvl1pPr algn="l">
+              <a:defRPr sz="1200"/>
+            </a:lvl1pPr>
+          </a:lstStyle>
+          <a:p>
+            <a:endParaRPr lang="en-US"/>
+          </a:p>
+        </p:txBody>
+      </p:sp>
+      <p:sp>
+        <p:nvSpPr>
+          <p:cNvPr id="7" name="Slide Number Placeholder 6"/>
+          <p:cNvSpPr>
+            <a:spLocks noGrp="1"/>
+          </p:cNvSpPr>
+          <p:nvPr>
+            <p:ph type="sldNum" sz="quarter" idx="5"/>
+          </p:nvPr>
+        </p:nvSpPr>
+        <p:spPr>
+          <a:xfrm>
+            <a:off x="3884613" y="8685213"/>
+            <a:ext cx="2971800" cy="458787"/>
+          </a:xfrm>
+          <a:prstGeom prst="rect">
+            <a:avLst/>
+          </a:prstGeom>
+        </p:spPr>
+        <p:txBody>
+          <a:bodyPr vert="horz" lIns="91440" tIns="45720" rIns="91440" bIns="45720" rtlCol="0" anchor="b"/>
+          <a:lstStyle>
+            <a:lvl1pPr algn="r">
+              <a:defRPr sz="1200"/>
+            </a:lvl1pPr>
+          </a:lstStyle>
+          <a:p>
+            <a:fld id="{EA2158A7-010F-4267-83B2-DA3580BDE926}" type="slidenum">
+              <a:rPr lang="en-US" smtClean="0"/>
+              <a:t>‹#›</a:t>
+            </a:fld>
+            <a:endParaRPr lang="en-US"/>
+          </a:p>
+        </p:txBody>
+      </p:sp>
+    </p:spTree>
+    <p:extLst>
+      <p:ext uri="{BB962C8B-B14F-4D97-AF65-F5344CB8AC3E}">
+        <p14:creationId xmlns:p14="http://schemas.microsoft.com/office/powerpoint/2010/main" val="2864238229"/>
+      </p:ext>
+    </p:extLst>
+  </p:cSld>
+  <p:clrMap bg1="lt1" tx1="dk1" bg2="lt2" tx2="dk2" accent1="accent1" accent2="accent2" accent3="accent3" accent4="accent4" accent5="accent5" accent6="accent6" hlink="hlink" folHlink="folHlink"/>
+  <p:notesStyle>
+    <a:lvl1pPr marL="0" algn="l" defTabSz="914400" rtl="0" eaLnBrk="1" latinLnBrk="0" hangingPunct="1">
+      <a:defRPr sz="1200" kern="1200">
+        <a:solidFill>
+          <a:schemeClr val="tx1"/>
+        </a:solidFill>
+        <a:latin typeface="+mn-lt"/>
+        <a:ea typeface="+mn-ea"/>
+        <a:cs typeface="+mn-cs"/>
+      </a:defRPr>
+    </a:lvl1pPr>
+    <a:lvl2pPr marL="457200" algn="l" defTabSz="914400" rtl="0" eaLnBrk="1" latinLnBrk="0" hangingPunct="1">
+      <a:defRPr sz="1200" kern="1200">
+        <a:solidFill>
+          <a:schemeClr val="tx1"/>
+        </a:solidFill>
+        <a:latin typeface="+mn-lt"/>
+        <a:ea typeface="+mn-ea"/>
+        <a:cs typeface="+mn-cs"/>
+      </a:defRPr>
+    </a:lvl2pPr>
+    <a:lvl3pPr marL="914400" algn="l" defTabSz="914400" rtl="0" eaLnBrk="1" latinLnBrk="0" hangingPunct="1">
+      <a:defRPr sz="1200" kern="1200">
+        <a:solidFill>
+          <a:schemeClr val="tx1"/>
+        </a:solidFill>
+        <a:latin typeface="+mn-lt"/>
+        <a:ea typeface="+mn-ea"/>
+        <a:cs typeface="+mn-cs"/>
+      </a:defRPr>
+    </a:lvl3pPr>
+    <a:lvl4pPr marL="1371600" algn="l" defTabSz="914400" rtl="0" eaLnBrk="1" latinLnBrk="0" hangingPunct="1">
+      <a:defRPr sz="1200" kern="1200">
+        <a:solidFill>
+          <a:schemeClr val="tx1"/>
+        </a:solidFill>
+        <a:latin typeface="+mn-lt"/>
+        <a:ea typeface="+mn-ea"/>
+        <a:cs typeface="+mn-cs"/>
+      </a:defRPr>
+    </a:lvl4pPr>
+    <a:lvl5pPr marL="1828800" algn="l" defTabSz="914400" rtl="0" eaLnBrk="1" latinLnBrk="0" hangingPunct="1">
+      <a:defRPr sz="1200" kern="1200">
+        <a:solidFill>
+          <a:schemeClr val="tx1"/>
+        </a:solidFill>
+        <a:latin typeface="+mn-lt"/>
+        <a:ea typeface="+mn-ea"/>
+        <a:cs typeface="+mn-cs"/>
+      </a:defRPr>
+    </a:lvl5pPr>
+    <a:lvl6pPr marL="2286000" algn="l" defTabSz="914400" rtl="0" eaLnBrk="1" latinLnBrk="0" hangingPunct="1">
+      <a:defRPr sz="1200" kern="1200">
+        <a:solidFill>
+          <a:schemeClr val="tx1"/>
+        </a:solidFill>
+        <a:latin typeface="+mn-lt"/>
+        <a:ea typeface="+mn-ea"/>
+        <a:cs typeface="+mn-cs"/>
+      </a:defRPr>
+    </a:lvl6pPr>
+    <a:lvl7pPr marL="2743200" algn="l" defTabSz="914400" rtl="0" eaLnBrk="1" latinLnBrk="0" hangingPunct="1">
+      <a:defRPr sz="1200" kern="1200">
+        <a:solidFill>
+          <a:schemeClr val="tx1"/>
+        </a:solidFill>
+        <a:latin typeface="+mn-lt"/>
+        <a:ea typeface="+mn-ea"/>
+        <a:cs typeface="+mn-cs"/>
+      </a:defRPr>
+    </a:lvl7pPr>
+    <a:lvl8pPr marL="3200400" algn="l" defTabSz="914400" rtl="0" eaLnBrk="1" latinLnBrk="0" hangingPunct="1">
+      <a:defRPr sz="1200" kern="1200">
+        <a:solidFill>
+          <a:schemeClr val="tx1"/>
+        </a:solidFill>
+        <a:latin typeface="+mn-lt"/>
+        <a:ea typeface="+mn-ea"/>
+        <a:cs typeface="+mn-cs"/>
+      </a:defRPr>
+    </a:lvl8pPr>
+    <a:lvl9pPr marL="3657600" algn="l" defTabSz="914400" rtl="0" eaLnBrk="1" latinLnBrk="0" hangingPunct="1">
+      <a:defRPr sz="1200" kern="1200">
+        <a:solidFill>
+          <a:schemeClr val="tx1"/>
+        </a:solidFill>
+        <a:latin typeface="+mn-lt"/>
+        <a:ea typeface="+mn-ea"/>
+        <a:cs typeface="+mn-cs"/>
+      </a:defRPr>
+    </a:lvl9pPr>
+  </p:notesStyle>
+</p:notesMaster>
+</file>
+
+<file path=ppt/notesSlides/notesSlide1.xml><?xml version="1.0" encoding="utf-8"?>
+<p:notes xmlns:a="http://schemas.openxmlformats.org/drawingml/2006/main" xmlns:r="http://schemas.openxmlformats.org/officeDocument/2006/relationships" xmlns:p="http://schemas.openxmlformats.org/presentationml/2006/main">
+  <p:cSld>
+    <p:spTree>
+      <p:nvGrpSpPr>
+        <p:cNvPr id="1" name=""/>
+        <p:cNvGrpSpPr/>
+        <p:nvPr/>
+      </p:nvGrpSpPr>
+      <p:grpSpPr>
+        <a:xfrm>
+          <a:off x="0" y="0"/>
+          <a:ext cx="0" cy="0"/>
+          <a:chOff x="0" y="0"/>
+          <a:chExt cx="0" cy="0"/>
+        </a:xfrm>
+      </p:grpSpPr>
+      <p:sp>
+        <p:nvSpPr>
+          <p:cNvPr id="2" name="Slide Image Placeholder 1"/>
+          <p:cNvSpPr>
+            <a:spLocks noGrp="1" noRot="1" noChangeAspect="1"/>
+          </p:cNvSpPr>
+          <p:nvPr>
+            <p:ph type="sldImg"/>
+          </p:nvPr>
+        </p:nvSpPr>
+        <p:spPr/>
+      </p:sp>
+      <p:sp>
+        <p:nvSpPr>
+          <p:cNvPr id="3" name="Notes Placeholder 2"/>
+          <p:cNvSpPr>
+            <a:spLocks noGrp="1"/>
+          </p:cNvSpPr>
+          <p:nvPr>
+            <p:ph type="body" idx="1"/>
+          </p:nvPr>
+        </p:nvSpPr>
+        <p:spPr/>
+        <p:txBody>
+          <a:bodyPr/>
+          <a:lstStyle/>
+          <a:p>
+            <a:r>
+              <a:rPr lang="en-US" dirty="0"/>
+              <a:t>5 min blocks</a:t>
+            </a:r>
+          </a:p>
+          <a:p>
+            <a:endParaRPr lang="en-US" dirty="0"/>
+          </a:p>
+          <a:p>
+            <a:r>
+              <a:rPr lang="en-US" dirty="0"/>
+              <a:t>Cortical beta drives subcortical beta – resulting in hyper synchronization between these two. </a:t>
+            </a:r>
+          </a:p>
+          <a:p>
+            <a:r>
+              <a:rPr lang="en-US" dirty="0"/>
+              <a:t>Complicated – motor beta related to movement is in upper beta whereas levodopa reduces LOW beta in STN</a:t>
+            </a:r>
+          </a:p>
+          <a:p>
+            <a:r>
+              <a:rPr lang="en-US" sz="1200" b="0" i="0" u="none" strike="noStrike" kern="1200" dirty="0">
+                <a:solidFill>
+                  <a:schemeClr val="tx1"/>
+                </a:solidFill>
+                <a:effectLst/>
+                <a:latin typeface="+mn-lt"/>
+                <a:ea typeface="+mn-ea"/>
+                <a:cs typeface="+mn-cs"/>
+              </a:rPr>
+              <a:t>Levodopa has not been conclusively shown to reduce cortico-STN coherence in the upper b frequency band</a:t>
+            </a:r>
+          </a:p>
+          <a:p>
+            <a:endParaRPr lang="en-US" sz="1200" b="0" i="0" u="none" strike="noStrike" kern="1200" dirty="0">
+              <a:solidFill>
+                <a:schemeClr val="tx1"/>
+              </a:solidFill>
+              <a:effectLst/>
+              <a:latin typeface="+mn-lt"/>
+              <a:ea typeface="+mn-ea"/>
+              <a:cs typeface="+mn-cs"/>
+            </a:endParaRPr>
+          </a:p>
+          <a:p>
+            <a:r>
+              <a:rPr lang="en-US" sz="1200" b="0" i="0" u="none" strike="noStrike" kern="1200" dirty="0">
+                <a:solidFill>
+                  <a:schemeClr val="tx1"/>
+                </a:solidFill>
+                <a:effectLst/>
+                <a:latin typeface="+mn-lt"/>
+                <a:ea typeface="+mn-ea"/>
+                <a:cs typeface="+mn-cs"/>
+              </a:rPr>
+              <a:t>STN gamma LEADS motor cortex gamma (unlike beta) </a:t>
+            </a:r>
+          </a:p>
+          <a:p>
+            <a:pPr marL="0" marR="0" lvl="0" indent="0" algn="l" defTabSz="914400" rtl="0" eaLnBrk="1" fontAlgn="auto" latinLnBrk="0" hangingPunct="1">
+              <a:lnSpc>
+                <a:spcPct val="100000"/>
+              </a:lnSpc>
+              <a:spcBef>
+                <a:spcPts val="0"/>
+              </a:spcBef>
+              <a:spcAft>
+                <a:spcPts val="0"/>
+              </a:spcAft>
+              <a:buClrTx/>
+              <a:buSzTx/>
+              <a:buFontTx/>
+              <a:buNone/>
+              <a:tabLst/>
+              <a:defRPr/>
+            </a:pPr>
+            <a:endParaRPr lang="en-US" sz="1200" b="0" i="0" u="none" strike="noStrike" kern="1200" dirty="0">
+              <a:solidFill>
+                <a:schemeClr val="tx1"/>
+              </a:solidFill>
+              <a:effectLst/>
+              <a:latin typeface="+mn-lt"/>
+              <a:ea typeface="+mn-ea"/>
+              <a:cs typeface="+mn-cs"/>
+            </a:endParaRPr>
+          </a:p>
+          <a:p>
+            <a:pPr marL="0" marR="0" lvl="0" indent="0" algn="l" defTabSz="914400" rtl="0" eaLnBrk="1" fontAlgn="auto" latinLnBrk="0" hangingPunct="1">
+              <a:lnSpc>
+                <a:spcPct val="100000"/>
+              </a:lnSpc>
+              <a:spcBef>
+                <a:spcPts val="0"/>
+              </a:spcBef>
+              <a:spcAft>
+                <a:spcPts val="0"/>
+              </a:spcAft>
+              <a:buClrTx/>
+              <a:buSzTx/>
+              <a:buFontTx/>
+              <a:buNone/>
+              <a:tabLst/>
+              <a:defRPr/>
+            </a:pPr>
+            <a:r>
+              <a:rPr lang="en-US" sz="1200" b="0" i="0" u="none" strike="noStrike" kern="1200" dirty="0">
+                <a:solidFill>
+                  <a:schemeClr val="tx1"/>
+                </a:solidFill>
+                <a:effectLst/>
+                <a:latin typeface="+mn-lt"/>
+                <a:ea typeface="+mn-ea"/>
+                <a:cs typeface="+mn-cs"/>
+              </a:rPr>
+              <a:t>Drop in STN beta correlates w/ RTs – STN beta must be desynchronized </a:t>
+            </a:r>
+          </a:p>
+          <a:p>
+            <a:endParaRPr lang="en-US" sz="1200" b="0" i="0" u="none" strike="noStrike" kern="1200" dirty="0">
+              <a:solidFill>
+                <a:schemeClr val="tx1"/>
+              </a:solidFill>
+              <a:effectLst/>
+              <a:latin typeface="+mn-lt"/>
+              <a:ea typeface="+mn-ea"/>
+              <a:cs typeface="+mn-cs"/>
+            </a:endParaRPr>
+          </a:p>
+          <a:p>
+            <a:endParaRPr lang="en-US" b="0" dirty="0">
+              <a:effectLst/>
+            </a:endParaRPr>
+          </a:p>
+          <a:p>
+            <a:pPr lvl="1" rtl="0" fontAlgn="base"/>
+            <a:r>
+              <a:rPr lang="en-US" sz="1200" b="1" i="0" u="none" strike="noStrike" kern="1200" dirty="0">
+                <a:solidFill>
+                  <a:schemeClr val="tx1"/>
+                </a:solidFill>
+                <a:effectLst/>
+                <a:latin typeface="+mn-lt"/>
+                <a:ea typeface="+mn-ea"/>
+                <a:cs typeface="+mn-cs"/>
+              </a:rPr>
+              <a:t>Paradox</a:t>
+            </a:r>
+            <a:r>
+              <a:rPr lang="en-US" sz="1200" b="0" i="0" u="none" strike="noStrike" kern="1200" dirty="0">
+                <a:solidFill>
+                  <a:schemeClr val="tx1"/>
+                </a:solidFill>
+                <a:effectLst/>
+                <a:latin typeface="+mn-lt"/>
+                <a:ea typeface="+mn-ea"/>
+                <a:cs typeface="+mn-cs"/>
+              </a:rPr>
+              <a:t>: How can cortical beta stay the same but STN beta increase so much if </a:t>
+            </a:r>
+            <a:r>
+              <a:rPr lang="en-US" sz="1200" b="0" i="0" u="none" strike="noStrike" kern="1200" dirty="0" err="1">
+                <a:solidFill>
+                  <a:schemeClr val="tx1"/>
+                </a:solidFill>
+                <a:effectLst/>
+                <a:latin typeface="+mn-lt"/>
+                <a:ea typeface="+mn-ea"/>
+                <a:cs typeface="+mn-cs"/>
+              </a:rPr>
+              <a:t>Ctx</a:t>
+            </a:r>
+            <a:r>
+              <a:rPr lang="en-US" sz="1200" b="0" i="0" u="none" strike="noStrike" kern="1200" dirty="0">
+                <a:solidFill>
+                  <a:schemeClr val="tx1"/>
+                </a:solidFill>
+                <a:effectLst/>
+                <a:latin typeface="+mn-lt"/>
+                <a:ea typeface="+mn-ea"/>
+                <a:cs typeface="+mn-cs"/>
+              </a:rPr>
+              <a:t> drives STN? </a:t>
+            </a:r>
+          </a:p>
+          <a:p>
+            <a:pPr lvl="2" rtl="0" fontAlgn="base"/>
+            <a:r>
+              <a:rPr lang="en-US" sz="1200" b="0" i="0" u="none" strike="noStrike" kern="1200" dirty="0">
+                <a:solidFill>
+                  <a:schemeClr val="tx1"/>
+                </a:solidFill>
+                <a:effectLst/>
+                <a:latin typeface="+mn-lt"/>
+                <a:ea typeface="+mn-ea"/>
+                <a:cs typeface="+mn-cs"/>
+              </a:rPr>
+              <a:t>Striatum does it (</a:t>
+            </a:r>
+            <a:r>
+              <a:rPr lang="en-US" sz="1200" b="0" i="0" u="none" strike="noStrike" kern="1200" dirty="0" err="1">
+                <a:solidFill>
+                  <a:schemeClr val="tx1"/>
+                </a:solidFill>
+                <a:effectLst/>
+                <a:latin typeface="+mn-lt"/>
+                <a:ea typeface="+mn-ea"/>
+                <a:cs typeface="+mn-cs"/>
+              </a:rPr>
+              <a:t>bc</a:t>
+            </a:r>
+            <a:r>
+              <a:rPr lang="en-US" sz="1200" b="0" i="0" u="none" strike="noStrike" kern="1200" dirty="0">
+                <a:solidFill>
+                  <a:schemeClr val="tx1"/>
+                </a:solidFill>
+                <a:effectLst/>
+                <a:latin typeface="+mn-lt"/>
+                <a:ea typeface="+mn-ea"/>
+                <a:cs typeface="+mn-cs"/>
+              </a:rPr>
+              <a:t> no </a:t>
+            </a:r>
+            <a:r>
+              <a:rPr lang="en-US" sz="1200" b="0" i="0" u="none" strike="noStrike" kern="1200" dirty="0" err="1">
+                <a:solidFill>
+                  <a:schemeClr val="tx1"/>
+                </a:solidFill>
+                <a:effectLst/>
+                <a:latin typeface="+mn-lt"/>
+                <a:ea typeface="+mn-ea"/>
+                <a:cs typeface="+mn-cs"/>
+              </a:rPr>
+              <a:t>dopa</a:t>
+            </a:r>
+            <a:r>
+              <a:rPr lang="en-US" sz="1200" b="0" i="0" u="none" strike="noStrike" kern="1200" dirty="0">
+                <a:solidFill>
+                  <a:schemeClr val="tx1"/>
+                </a:solidFill>
+                <a:effectLst/>
+                <a:latin typeface="+mn-lt"/>
+                <a:ea typeface="+mn-ea"/>
+                <a:cs typeface="+mn-cs"/>
+              </a:rPr>
+              <a:t>)</a:t>
+            </a:r>
+          </a:p>
+          <a:p>
+            <a:pPr lvl="2" rtl="0" fontAlgn="base"/>
+            <a:r>
+              <a:rPr lang="en-US" sz="1200" b="0" i="0" u="none" strike="noStrike" kern="1200" dirty="0">
+                <a:solidFill>
+                  <a:schemeClr val="tx1"/>
+                </a:solidFill>
+                <a:effectLst/>
+                <a:latin typeface="+mn-lt"/>
+                <a:ea typeface="+mn-ea"/>
+                <a:cs typeface="+mn-cs"/>
+              </a:rPr>
+              <a:t>Plasticity changes =&gt; oscillatory amplification</a:t>
+            </a:r>
+          </a:p>
+          <a:p>
+            <a:pPr lvl="2" rtl="0" fontAlgn="base"/>
+            <a:r>
+              <a:rPr lang="en-US" sz="1200" b="0" i="0" u="none" strike="noStrike" kern="1200" dirty="0">
+                <a:solidFill>
+                  <a:schemeClr val="tx1"/>
+                </a:solidFill>
+                <a:effectLst/>
+                <a:latin typeface="+mn-lt"/>
+                <a:ea typeface="+mn-ea"/>
+                <a:cs typeface="+mn-cs"/>
+              </a:rPr>
+              <a:t>STN/</a:t>
+            </a:r>
+            <a:r>
+              <a:rPr lang="en-US" sz="1200" b="0" i="0" u="none" strike="noStrike" kern="1200" dirty="0" err="1">
+                <a:solidFill>
+                  <a:schemeClr val="tx1"/>
+                </a:solidFill>
+                <a:effectLst/>
+                <a:latin typeface="+mn-lt"/>
+                <a:ea typeface="+mn-ea"/>
+                <a:cs typeface="+mn-cs"/>
+              </a:rPr>
+              <a:t>GPe</a:t>
+            </a:r>
+            <a:r>
+              <a:rPr lang="en-US" sz="1200" b="0" i="0" u="none" strike="noStrike" kern="1200" dirty="0">
+                <a:solidFill>
+                  <a:schemeClr val="tx1"/>
+                </a:solidFill>
+                <a:effectLst/>
+                <a:latin typeface="+mn-lt"/>
+                <a:ea typeface="+mn-ea"/>
+                <a:cs typeface="+mn-cs"/>
+              </a:rPr>
+              <a:t> interactions promote more beta </a:t>
+            </a:r>
+          </a:p>
+          <a:p>
+            <a:pPr lvl="2" rtl="0" fontAlgn="base"/>
+            <a:r>
+              <a:rPr lang="en-US" sz="1200" b="0" i="0" u="none" strike="noStrike" kern="1200" dirty="0">
+                <a:solidFill>
+                  <a:schemeClr val="tx1"/>
+                </a:solidFill>
+                <a:effectLst/>
+                <a:latin typeface="+mn-lt"/>
+                <a:ea typeface="+mn-ea"/>
+                <a:cs typeface="+mn-cs"/>
+              </a:rPr>
+              <a:t>Imbalance in </a:t>
+            </a:r>
+            <a:r>
+              <a:rPr lang="en-US" sz="1200" b="0" i="0" u="none" strike="noStrike" kern="1200" dirty="0" err="1">
+                <a:solidFill>
+                  <a:schemeClr val="tx1"/>
+                </a:solidFill>
+                <a:effectLst/>
+                <a:latin typeface="+mn-lt"/>
+                <a:ea typeface="+mn-ea"/>
+                <a:cs typeface="+mn-cs"/>
+              </a:rPr>
+              <a:t>hyperdirect</a:t>
+            </a:r>
+            <a:r>
+              <a:rPr lang="en-US" sz="1200" b="0" i="0" u="none" strike="noStrike" kern="1200" dirty="0">
+                <a:solidFill>
+                  <a:schemeClr val="tx1"/>
+                </a:solidFill>
+                <a:effectLst/>
+                <a:latin typeface="+mn-lt"/>
+                <a:ea typeface="+mn-ea"/>
+                <a:cs typeface="+mn-cs"/>
+              </a:rPr>
+              <a:t> and direct pathway</a:t>
+            </a:r>
+          </a:p>
+          <a:p>
+            <a:endParaRPr lang="en-US" sz="1200" b="0" i="0" u="none" strike="noStrike" kern="1200" dirty="0">
+              <a:solidFill>
+                <a:schemeClr val="tx1"/>
+              </a:solidFill>
+              <a:effectLst/>
+              <a:latin typeface="+mn-lt"/>
+              <a:ea typeface="+mn-ea"/>
+              <a:cs typeface="+mn-cs"/>
+            </a:endParaRPr>
+          </a:p>
+          <a:p>
+            <a:endParaRPr lang="en-US" dirty="0"/>
+          </a:p>
+        </p:txBody>
+      </p:sp>
+      <p:sp>
+        <p:nvSpPr>
+          <p:cNvPr id="4" name="Slide Number Placeholder 3"/>
+          <p:cNvSpPr>
+            <a:spLocks noGrp="1"/>
+          </p:cNvSpPr>
+          <p:nvPr>
+            <p:ph type="sldNum" sz="quarter" idx="10"/>
+          </p:nvPr>
+        </p:nvSpPr>
+        <p:spPr/>
+        <p:txBody>
+          <a:bodyPr/>
+          <a:lstStyle/>
+          <a:p>
+            <a:fld id="{EA2158A7-010F-4267-83B2-DA3580BDE926}" type="slidenum">
+              <a:rPr lang="en-US" smtClean="0"/>
+              <a:t>9</a:t>
+            </a:fld>
+            <a:endParaRPr lang="en-US"/>
+          </a:p>
+        </p:txBody>
+      </p:sp>
+    </p:spTree>
+    <p:extLst>
+      <p:ext uri="{BB962C8B-B14F-4D97-AF65-F5344CB8AC3E}">
+        <p14:creationId xmlns:p14="http://schemas.microsoft.com/office/powerpoint/2010/main" val="2507147056"/>
+      </p:ext>
+    </p:extLst>
+  </p:cSld>
+  <p:clrMapOvr>
+    <a:masterClrMapping/>
+  </p:clrMapOvr>
+</p:notes>
 </file>
 
 <file path=ppt/slideLayouts/slideLayout1.xml><?xml version="1.0" encoding="utf-8"?>
@@ -170,7 +969,6 @@
               <a:rPr lang="en-US"/>
               <a:t>Click to edit Master title style</a:t>
             </a:r>
-            <a:endParaRPr lang="en-US"/>
           </a:p>
         </p:txBody>
       </p:sp>
@@ -235,7 +1033,6 @@
               <a:rPr lang="en-US"/>
               <a:t>Click to edit Master subtitle style</a:t>
             </a:r>
-            <a:endParaRPr lang="en-US"/>
           </a:p>
         </p:txBody>
       </p:sp>
@@ -256,7 +1053,7 @@
           <a:p>
             <a:fld id="{A4580949-5FE3-4971-AB12-C6CC597A9E2D}" type="datetimeFigureOut">
               <a:rPr lang="en-US" smtClean="0"/>
-              <a:t>3/5/2017</a:t>
+              <a:t>3/6/2017</a:t>
             </a:fld>
             <a:endParaRPr lang="en-US"/>
           </a:p>
@@ -353,7 +1150,6 @@
               <a:rPr lang="en-US"/>
               <a:t>Click to edit Master title style</a:t>
             </a:r>
-            <a:endParaRPr lang="en-US"/>
           </a:p>
         </p:txBody>
       </p:sp>
@@ -405,7 +1201,6 @@
               <a:rPr lang="en-US"/>
               <a:t>Fifth level</a:t>
             </a:r>
-            <a:endParaRPr lang="en-US"/>
           </a:p>
         </p:txBody>
       </p:sp>
@@ -426,7 +1221,7 @@
           <a:p>
             <a:fld id="{A4580949-5FE3-4971-AB12-C6CC597A9E2D}" type="datetimeFigureOut">
               <a:rPr lang="en-US" smtClean="0"/>
-              <a:t>3/5/2017</a:t>
+              <a:t>3/6/2017</a:t>
             </a:fld>
             <a:endParaRPr lang="en-US"/>
           </a:p>
@@ -528,7 +1323,6 @@
               <a:rPr lang="en-US"/>
               <a:t>Click to edit Master title style</a:t>
             </a:r>
-            <a:endParaRPr lang="en-US"/>
           </a:p>
         </p:txBody>
       </p:sp>
@@ -585,7 +1379,6 @@
               <a:rPr lang="en-US"/>
               <a:t>Fifth level</a:t>
             </a:r>
-            <a:endParaRPr lang="en-US"/>
           </a:p>
         </p:txBody>
       </p:sp>
@@ -606,7 +1399,7 @@
           <a:p>
             <a:fld id="{A4580949-5FE3-4971-AB12-C6CC597A9E2D}" type="datetimeFigureOut">
               <a:rPr lang="en-US" smtClean="0"/>
-              <a:t>3/5/2017</a:t>
+              <a:t>3/6/2017</a:t>
             </a:fld>
             <a:endParaRPr lang="en-US"/>
           </a:p>
@@ -703,7 +1496,6 @@
               <a:rPr lang="en-US"/>
               <a:t>Click to edit Master title style</a:t>
             </a:r>
-            <a:endParaRPr lang="en-US"/>
           </a:p>
         </p:txBody>
       </p:sp>
@@ -755,7 +1547,6 @@
               <a:rPr lang="en-US"/>
               <a:t>Fifth level</a:t>
             </a:r>
-            <a:endParaRPr lang="en-US"/>
           </a:p>
         </p:txBody>
       </p:sp>
@@ -776,7 +1567,7 @@
           <a:p>
             <a:fld id="{A4580949-5FE3-4971-AB12-C6CC597A9E2D}" type="datetimeFigureOut">
               <a:rPr lang="en-US" smtClean="0"/>
-              <a:t>3/5/2017</a:t>
+              <a:t>3/6/2017</a:t>
             </a:fld>
             <a:endParaRPr lang="en-US"/>
           </a:p>
@@ -882,7 +1673,6 @@
               <a:rPr lang="en-US"/>
               <a:t>Click to edit Master title style</a:t>
             </a:r>
-            <a:endParaRPr lang="en-US"/>
           </a:p>
         </p:txBody>
       </p:sp>
@@ -1022,7 +1812,7 @@
           <a:p>
             <a:fld id="{A4580949-5FE3-4971-AB12-C6CC597A9E2D}" type="datetimeFigureOut">
               <a:rPr lang="en-US" smtClean="0"/>
-              <a:t>3/5/2017</a:t>
+              <a:t>3/6/2017</a:t>
             </a:fld>
             <a:endParaRPr lang="en-US"/>
           </a:p>
@@ -1119,7 +1909,6 @@
               <a:rPr lang="en-US"/>
               <a:t>Click to edit Master title style</a:t>
             </a:r>
-            <a:endParaRPr lang="en-US"/>
           </a:p>
         </p:txBody>
       </p:sp>
@@ -1176,7 +1965,6 @@
               <a:rPr lang="en-US"/>
               <a:t>Fifth level</a:t>
             </a:r>
-            <a:endParaRPr lang="en-US"/>
           </a:p>
         </p:txBody>
       </p:sp>
@@ -1233,7 +2021,6 @@
               <a:rPr lang="en-US"/>
               <a:t>Fifth level</a:t>
             </a:r>
-            <a:endParaRPr lang="en-US"/>
           </a:p>
         </p:txBody>
       </p:sp>
@@ -1254,7 +2041,7 @@
           <a:p>
             <a:fld id="{A4580949-5FE3-4971-AB12-C6CC597A9E2D}" type="datetimeFigureOut">
               <a:rPr lang="en-US" smtClean="0"/>
-              <a:t>3/5/2017</a:t>
+              <a:t>3/6/2017</a:t>
             </a:fld>
             <a:endParaRPr lang="en-US"/>
           </a:p>
@@ -1356,7 +2143,6 @@
               <a:rPr lang="en-US"/>
               <a:t>Click to edit Master title style</a:t>
             </a:r>
-            <a:endParaRPr lang="en-US"/>
           </a:p>
         </p:txBody>
       </p:sp>
@@ -1478,7 +2264,6 @@
               <a:rPr lang="en-US"/>
               <a:t>Fifth level</a:t>
             </a:r>
-            <a:endParaRPr lang="en-US"/>
           </a:p>
         </p:txBody>
       </p:sp>
@@ -1600,7 +2385,6 @@
               <a:rPr lang="en-US"/>
               <a:t>Fifth level</a:t>
             </a:r>
-            <a:endParaRPr lang="en-US"/>
           </a:p>
         </p:txBody>
       </p:sp>
@@ -1621,7 +2405,7 @@
           <a:p>
             <a:fld id="{A4580949-5FE3-4971-AB12-C6CC597A9E2D}" type="datetimeFigureOut">
               <a:rPr lang="en-US" smtClean="0"/>
-              <a:t>3/5/2017</a:t>
+              <a:t>3/6/2017</a:t>
             </a:fld>
             <a:endParaRPr lang="en-US"/>
           </a:p>
@@ -1718,7 +2502,6 @@
               <a:rPr lang="en-US"/>
               <a:t>Click to edit Master title style</a:t>
             </a:r>
-            <a:endParaRPr lang="en-US"/>
           </a:p>
         </p:txBody>
       </p:sp>
@@ -1739,7 +2522,7 @@
           <a:p>
             <a:fld id="{A4580949-5FE3-4971-AB12-C6CC597A9E2D}" type="datetimeFigureOut">
               <a:rPr lang="en-US" smtClean="0"/>
-              <a:t>3/5/2017</a:t>
+              <a:t>3/6/2017</a:t>
             </a:fld>
             <a:endParaRPr lang="en-US"/>
           </a:p>
@@ -1834,7 +2617,7 @@
           <a:p>
             <a:fld id="{A4580949-5FE3-4971-AB12-C6CC597A9E2D}" type="datetimeFigureOut">
               <a:rPr lang="en-US" smtClean="0"/>
-              <a:t>3/5/2017</a:t>
+              <a:t>3/6/2017</a:t>
             </a:fld>
             <a:endParaRPr lang="en-US"/>
           </a:p>
@@ -1940,7 +2723,6 @@
               <a:rPr lang="en-US"/>
               <a:t>Click to edit Master title style</a:t>
             </a:r>
-            <a:endParaRPr lang="en-US"/>
           </a:p>
         </p:txBody>
       </p:sp>
@@ -2025,7 +2807,6 @@
               <a:rPr lang="en-US"/>
               <a:t>Fifth level</a:t>
             </a:r>
-            <a:endParaRPr lang="en-US"/>
           </a:p>
         </p:txBody>
       </p:sp>
@@ -2111,7 +2892,7 @@
           <a:p>
             <a:fld id="{A4580949-5FE3-4971-AB12-C6CC597A9E2D}" type="datetimeFigureOut">
               <a:rPr lang="en-US" smtClean="0"/>
-              <a:t>3/5/2017</a:t>
+              <a:t>3/6/2017</a:t>
             </a:fld>
             <a:endParaRPr lang="en-US"/>
           </a:p>
@@ -2217,7 +2998,6 @@
               <a:rPr lang="en-US"/>
               <a:t>Click to edit Master title style</a:t>
             </a:r>
-            <a:endParaRPr lang="en-US"/>
           </a:p>
         </p:txBody>
       </p:sp>
@@ -2364,7 +3144,7 @@
           <a:p>
             <a:fld id="{A4580949-5FE3-4971-AB12-C6CC597A9E2D}" type="datetimeFigureOut">
               <a:rPr lang="en-US" smtClean="0"/>
-              <a:t>3/5/2017</a:t>
+              <a:t>3/6/2017</a:t>
             </a:fld>
             <a:endParaRPr lang="en-US"/>
           </a:p>
@@ -2476,7 +3256,6 @@
               <a:rPr lang="en-US"/>
               <a:t>Click to edit Master title style</a:t>
             </a:r>
-            <a:endParaRPr lang="en-US"/>
           </a:p>
         </p:txBody>
       </p:sp>
@@ -2538,7 +3317,6 @@
               <a:rPr lang="en-US"/>
               <a:t>Fifth level</a:t>
             </a:r>
-            <a:endParaRPr lang="en-US"/>
           </a:p>
         </p:txBody>
       </p:sp>
@@ -2577,7 +3355,7 @@
           <a:p>
             <a:fld id="{A4580949-5FE3-4971-AB12-C6CC597A9E2D}" type="datetimeFigureOut">
               <a:rPr lang="en-US" smtClean="0"/>
-              <a:t>3/5/2017</a:t>
+              <a:t>3/6/2017</a:t>
             </a:fld>
             <a:endParaRPr lang="en-US"/>
           </a:p>
@@ -3030,6 +3808,690 @@
     <p:extLst>
       <p:ext uri="{BB962C8B-B14F-4D97-AF65-F5344CB8AC3E}">
         <p14:creationId xmlns:p14="http://schemas.microsoft.com/office/powerpoint/2010/main" val="103927065"/>
+      </p:ext>
+    </p:extLst>
+  </p:cSld>
+  <p:clrMapOvr>
+    <a:masterClrMapping/>
+  </p:clrMapOvr>
+</p:sld>
+</file>
+
+<file path=ppt/slides/slide10.xml><?xml version="1.0" encoding="utf-8"?>
+<p:sld xmlns:a="http://schemas.openxmlformats.org/drawingml/2006/main" xmlns:r="http://schemas.openxmlformats.org/officeDocument/2006/relationships" xmlns:p="http://schemas.openxmlformats.org/presentationml/2006/main">
+  <p:cSld>
+    <p:spTree>
+      <p:nvGrpSpPr>
+        <p:cNvPr id="1" name=""/>
+        <p:cNvGrpSpPr/>
+        <p:nvPr/>
+      </p:nvGrpSpPr>
+      <p:grpSpPr>
+        <a:xfrm>
+          <a:off x="0" y="0"/>
+          <a:ext cx="0" cy="0"/>
+          <a:chOff x="0" y="0"/>
+          <a:chExt cx="0" cy="0"/>
+        </a:xfrm>
+      </p:grpSpPr>
+      <p:sp>
+        <p:nvSpPr>
+          <p:cNvPr id="2" name="Title 1"/>
+          <p:cNvSpPr>
+            <a:spLocks noGrp="1"/>
+          </p:cNvSpPr>
+          <p:nvPr>
+            <p:ph type="title"/>
+          </p:nvPr>
+        </p:nvSpPr>
+        <p:spPr/>
+        <p:txBody>
+          <a:bodyPr/>
+          <a:lstStyle/>
+          <a:p>
+            <a:r>
+              <a:rPr lang="en-US" dirty="0"/>
+              <a:t>Tapping Metrics?</a:t>
+            </a:r>
+          </a:p>
+        </p:txBody>
+      </p:sp>
+      <p:graphicFrame>
+        <p:nvGraphicFramePr>
+          <p:cNvPr id="4" name="Table 3"/>
+          <p:cNvGraphicFramePr>
+            <a:graphicFrameLocks noGrp="1"/>
+          </p:cNvGraphicFramePr>
+          <p:nvPr>
+            <p:extLst>
+              <p:ext uri="{D42A27DB-BD31-4B8C-83A1-F6EECF244321}">
+                <p14:modId xmlns:p14="http://schemas.microsoft.com/office/powerpoint/2010/main" val="392084459"/>
+              </p:ext>
+            </p:extLst>
+          </p:nvPr>
+        </p:nvGraphicFramePr>
+        <p:xfrm>
+          <a:off x="1012825" y="2176991"/>
+          <a:ext cx="5397500" cy="2595880"/>
+        </p:xfrm>
+        <a:graphic>
+          <a:graphicData uri="http://schemas.openxmlformats.org/drawingml/2006/table">
+            <a:tbl>
+              <a:tblPr firstRow="1" bandRow="1">
+                <a:tableStyleId>{5C22544A-7EE6-4342-B048-85BDC9FD1C3A}</a:tableStyleId>
+              </a:tblPr>
+              <a:tblGrid>
+                <a:gridCol w="2711450">
+                  <a:extLst>
+                    <a:ext uri="{9D8B030D-6E8A-4147-A177-3AD203B41FA5}">
+                      <a16:colId xmlns:a16="http://schemas.microsoft.com/office/drawing/2014/main" val="2380361349"/>
+                    </a:ext>
+                  </a:extLst>
+                </a:gridCol>
+                <a:gridCol w="2686050">
+                  <a:extLst>
+                    <a:ext uri="{9D8B030D-6E8A-4147-A177-3AD203B41FA5}">
+                      <a16:colId xmlns:a16="http://schemas.microsoft.com/office/drawing/2014/main" val="2096350973"/>
+                    </a:ext>
+                  </a:extLst>
+                </a:gridCol>
+              </a:tblGrid>
+              <a:tr h="370840">
+                <a:tc>
+                  <a:txBody>
+                    <a:bodyPr/>
+                    <a:lstStyle/>
+                    <a:p>
+                      <a:r>
+                        <a:rPr lang="en-US" dirty="0"/>
+                        <a:t>Metric</a:t>
+                      </a:r>
+                    </a:p>
+                  </a:txBody>
+                  <a:tcPr/>
+                </a:tc>
+                <a:tc>
+                  <a:txBody>
+                    <a:bodyPr/>
+                    <a:lstStyle/>
+                    <a:p>
+                      <a:r>
+                        <a:rPr lang="en-US" dirty="0"/>
+                        <a:t>High vs. Low Target</a:t>
+                      </a:r>
+                    </a:p>
+                  </a:txBody>
+                  <a:tcPr/>
+                </a:tc>
+                <a:extLst>
+                  <a:ext uri="{0D108BD9-81ED-4DB2-BD59-A6C34878D82A}">
+                    <a16:rowId xmlns:a16="http://schemas.microsoft.com/office/drawing/2014/main" val="4010628219"/>
+                  </a:ext>
+                </a:extLst>
+              </a:tr>
+              <a:tr h="370840">
+                <a:tc>
+                  <a:txBody>
+                    <a:bodyPr/>
+                    <a:lstStyle/>
+                    <a:p>
+                      <a:r>
+                        <a:rPr lang="en-US" dirty="0">
+                          <a:solidFill>
+                            <a:srgbClr val="FF0000"/>
+                          </a:solidFill>
+                        </a:rPr>
+                        <a:t>Movement Onset Time</a:t>
+                      </a:r>
+                    </a:p>
+                  </a:txBody>
+                  <a:tcPr/>
+                </a:tc>
+                <a:tc>
+                  <a:txBody>
+                    <a:bodyPr/>
+                    <a:lstStyle/>
+                    <a:p>
+                      <a:r>
+                        <a:rPr lang="en-US" dirty="0">
+                          <a:solidFill>
+                            <a:srgbClr val="FF0000"/>
+                          </a:solidFill>
+                        </a:rPr>
+                        <a:t>Low target faster MOT</a:t>
+                      </a:r>
+                    </a:p>
+                  </a:txBody>
+                  <a:tcPr/>
+                </a:tc>
+                <a:extLst>
+                  <a:ext uri="{0D108BD9-81ED-4DB2-BD59-A6C34878D82A}">
+                    <a16:rowId xmlns:a16="http://schemas.microsoft.com/office/drawing/2014/main" val="4243284156"/>
+                  </a:ext>
+                </a:extLst>
+              </a:tr>
+              <a:tr h="370840">
+                <a:tc>
+                  <a:txBody>
+                    <a:bodyPr/>
+                    <a:lstStyle/>
+                    <a:p>
+                      <a:r>
+                        <a:rPr lang="en-US" dirty="0"/>
+                        <a:t>Spectral Peak Power</a:t>
+                      </a:r>
+                    </a:p>
+                  </a:txBody>
+                  <a:tcPr/>
+                </a:tc>
+                <a:tc>
+                  <a:txBody>
+                    <a:bodyPr/>
+                    <a:lstStyle/>
+                    <a:p>
+                      <a:r>
+                        <a:rPr lang="en-US" dirty="0"/>
+                        <a:t>Low target more power</a:t>
+                      </a:r>
+                    </a:p>
+                  </a:txBody>
+                  <a:tcPr/>
+                </a:tc>
+                <a:extLst>
+                  <a:ext uri="{0D108BD9-81ED-4DB2-BD59-A6C34878D82A}">
+                    <a16:rowId xmlns:a16="http://schemas.microsoft.com/office/drawing/2014/main" val="596002562"/>
+                  </a:ext>
+                </a:extLst>
+              </a:tr>
+              <a:tr h="370840">
+                <a:tc>
+                  <a:txBody>
+                    <a:bodyPr/>
+                    <a:lstStyle/>
+                    <a:p>
+                      <a:r>
+                        <a:rPr lang="en-US" dirty="0">
+                          <a:solidFill>
+                            <a:srgbClr val="FF0000"/>
+                          </a:solidFill>
+                        </a:rPr>
+                        <a:t>Spectral Peak</a:t>
+                      </a:r>
+                    </a:p>
+                  </a:txBody>
+                  <a:tcPr/>
+                </a:tc>
+                <a:tc>
+                  <a:txBody>
+                    <a:bodyPr/>
+                    <a:lstStyle/>
+                    <a:p>
+                      <a:r>
+                        <a:rPr lang="en-US" dirty="0">
+                          <a:solidFill>
+                            <a:srgbClr val="FF0000"/>
+                          </a:solidFill>
+                        </a:rPr>
+                        <a:t>Low target faster</a:t>
+                      </a:r>
+                    </a:p>
+                  </a:txBody>
+                  <a:tcPr/>
+                </a:tc>
+                <a:extLst>
+                  <a:ext uri="{0D108BD9-81ED-4DB2-BD59-A6C34878D82A}">
+                    <a16:rowId xmlns:a16="http://schemas.microsoft.com/office/drawing/2014/main" val="58101759"/>
+                  </a:ext>
+                </a:extLst>
+              </a:tr>
+              <a:tr h="370840">
+                <a:tc>
+                  <a:txBody>
+                    <a:bodyPr/>
+                    <a:lstStyle/>
+                    <a:p>
+                      <a:r>
+                        <a:rPr lang="en-US" dirty="0"/>
+                        <a:t>RMS Angle</a:t>
+                      </a:r>
+                    </a:p>
+                  </a:txBody>
+                  <a:tcPr/>
+                </a:tc>
+                <a:tc>
+                  <a:txBody>
+                    <a:bodyPr/>
+                    <a:lstStyle/>
+                    <a:p>
+                      <a:r>
+                        <a:rPr lang="en-US" dirty="0"/>
+                        <a:t>Low target higher</a:t>
+                      </a:r>
+                    </a:p>
+                  </a:txBody>
+                  <a:tcPr/>
+                </a:tc>
+                <a:extLst>
+                  <a:ext uri="{0D108BD9-81ED-4DB2-BD59-A6C34878D82A}">
+                    <a16:rowId xmlns:a16="http://schemas.microsoft.com/office/drawing/2014/main" val="466214897"/>
+                  </a:ext>
+                </a:extLst>
+              </a:tr>
+              <a:tr h="370840">
+                <a:tc>
+                  <a:txBody>
+                    <a:bodyPr/>
+                    <a:lstStyle/>
+                    <a:p>
+                      <a:r>
+                        <a:rPr lang="en-US" dirty="0"/>
+                        <a:t>RMS Angular Velocity</a:t>
+                      </a:r>
+                    </a:p>
+                  </a:txBody>
+                  <a:tcPr/>
+                </a:tc>
+                <a:tc>
+                  <a:txBody>
+                    <a:bodyPr/>
+                    <a:lstStyle/>
+                    <a:p>
+                      <a:r>
+                        <a:rPr lang="en-US" dirty="0"/>
+                        <a:t>Low target higher</a:t>
+                      </a:r>
+                    </a:p>
+                  </a:txBody>
+                  <a:tcPr/>
+                </a:tc>
+                <a:extLst>
+                  <a:ext uri="{0D108BD9-81ED-4DB2-BD59-A6C34878D82A}">
+                    <a16:rowId xmlns:a16="http://schemas.microsoft.com/office/drawing/2014/main" val="886295144"/>
+                  </a:ext>
+                </a:extLst>
+              </a:tr>
+              <a:tr h="370840">
+                <a:tc>
+                  <a:txBody>
+                    <a:bodyPr/>
+                    <a:lstStyle/>
+                    <a:p>
+                      <a:r>
+                        <a:rPr lang="en-US" dirty="0"/>
+                        <a:t># Discrete Taps</a:t>
+                      </a:r>
+                    </a:p>
+                  </a:txBody>
+                  <a:tcPr/>
+                </a:tc>
+                <a:tc>
+                  <a:txBody>
+                    <a:bodyPr/>
+                    <a:lstStyle/>
+                    <a:p>
+                      <a:r>
+                        <a:rPr lang="en-US" dirty="0"/>
+                        <a:t>More for lower target</a:t>
+                      </a:r>
+                    </a:p>
+                  </a:txBody>
+                  <a:tcPr/>
+                </a:tc>
+                <a:extLst>
+                  <a:ext uri="{0D108BD9-81ED-4DB2-BD59-A6C34878D82A}">
+                    <a16:rowId xmlns:a16="http://schemas.microsoft.com/office/drawing/2014/main" val="1764483748"/>
+                  </a:ext>
+                </a:extLst>
+              </a:tr>
+            </a:tbl>
+          </a:graphicData>
+        </a:graphic>
+      </p:graphicFrame>
+      <p:pic>
+        <p:nvPicPr>
+          <p:cNvPr id="6" name="Picture 5"/>
+          <p:cNvPicPr>
+            <a:picLocks noChangeAspect="1"/>
+          </p:cNvPicPr>
+          <p:nvPr/>
+        </p:nvPicPr>
+        <p:blipFill>
+          <a:blip r:embed="rId2">
+            <a:extLst>
+              <a:ext uri="{28A0092B-C50C-407E-A947-70E740481C1C}">
+                <a14:useLocalDpi xmlns:a14="http://schemas.microsoft.com/office/drawing/2010/main" val="0"/>
+              </a:ext>
+            </a:extLst>
+          </a:blip>
+          <a:stretch>
+            <a:fillRect/>
+          </a:stretch>
+        </p:blipFill>
+        <p:spPr>
+          <a:xfrm>
+            <a:off x="7426871" y="365125"/>
+            <a:ext cx="3952875" cy="2963180"/>
+          </a:xfrm>
+          <a:prstGeom prst="rect">
+            <a:avLst/>
+          </a:prstGeom>
+        </p:spPr>
+      </p:pic>
+      <p:pic>
+        <p:nvPicPr>
+          <p:cNvPr id="8" name="Picture 7"/>
+          <p:cNvPicPr>
+            <a:picLocks noChangeAspect="1"/>
+          </p:cNvPicPr>
+          <p:nvPr/>
+        </p:nvPicPr>
+        <p:blipFill>
+          <a:blip r:embed="rId3">
+            <a:extLst>
+              <a:ext uri="{28A0092B-C50C-407E-A947-70E740481C1C}">
+                <a14:useLocalDpi xmlns:a14="http://schemas.microsoft.com/office/drawing/2010/main" val="0"/>
+              </a:ext>
+            </a:extLst>
+          </a:blip>
+          <a:stretch>
+            <a:fillRect/>
+          </a:stretch>
+        </p:blipFill>
+        <p:spPr>
+          <a:xfrm>
+            <a:off x="7439843" y="3580894"/>
+            <a:ext cx="3926929" cy="2943731"/>
+          </a:xfrm>
+          <a:prstGeom prst="rect">
+            <a:avLst/>
+          </a:prstGeom>
+        </p:spPr>
+      </p:pic>
+      <p:cxnSp>
+        <p:nvCxnSpPr>
+          <p:cNvPr id="10" name="Straight Arrow Connector 9"/>
+          <p:cNvCxnSpPr/>
+          <p:nvPr/>
+        </p:nvCxnSpPr>
+        <p:spPr>
+          <a:xfrm flipV="1">
+            <a:off x="6524625" y="2176991"/>
+            <a:ext cx="990600" cy="528109"/>
+          </a:xfrm>
+          <a:prstGeom prst="straightConnector1">
+            <a:avLst/>
+          </a:prstGeom>
+          <a:ln>
+            <a:tailEnd type="triangle"/>
+          </a:ln>
+        </p:spPr>
+        <p:style>
+          <a:lnRef idx="1">
+            <a:schemeClr val="accent1"/>
+          </a:lnRef>
+          <a:fillRef idx="0">
+            <a:schemeClr val="accent1"/>
+          </a:fillRef>
+          <a:effectRef idx="0">
+            <a:schemeClr val="accent1"/>
+          </a:effectRef>
+          <a:fontRef idx="minor">
+            <a:schemeClr val="tx1"/>
+          </a:fontRef>
+        </p:style>
+      </p:cxnSp>
+      <p:cxnSp>
+        <p:nvCxnSpPr>
+          <p:cNvPr id="11" name="Straight Arrow Connector 10"/>
+          <p:cNvCxnSpPr>
+            <a:cxnSpLocks/>
+          </p:cNvCxnSpPr>
+          <p:nvPr/>
+        </p:nvCxnSpPr>
+        <p:spPr>
+          <a:xfrm>
+            <a:off x="6524625" y="3474932"/>
+            <a:ext cx="990600" cy="554143"/>
+          </a:xfrm>
+          <a:prstGeom prst="straightConnector1">
+            <a:avLst/>
+          </a:prstGeom>
+          <a:ln>
+            <a:tailEnd type="triangle"/>
+          </a:ln>
+        </p:spPr>
+        <p:style>
+          <a:lnRef idx="1">
+            <a:schemeClr val="accent1"/>
+          </a:lnRef>
+          <a:fillRef idx="0">
+            <a:schemeClr val="accent1"/>
+          </a:fillRef>
+          <a:effectRef idx="0">
+            <a:schemeClr val="accent1"/>
+          </a:effectRef>
+          <a:fontRef idx="minor">
+            <a:schemeClr val="tx1"/>
+          </a:fontRef>
+        </p:style>
+      </p:cxnSp>
+      <p:sp>
+        <p:nvSpPr>
+          <p:cNvPr id="3" name="Rectangle 2"/>
+          <p:cNvSpPr/>
+          <p:nvPr/>
+        </p:nvSpPr>
+        <p:spPr>
+          <a:xfrm>
+            <a:off x="1012825" y="5259174"/>
+            <a:ext cx="6096000" cy="923330"/>
+          </a:xfrm>
+          <a:prstGeom prst="rect">
+            <a:avLst/>
+          </a:prstGeom>
+        </p:spPr>
+        <p:txBody>
+          <a:bodyPr>
+            <a:spAutoFit/>
+          </a:bodyPr>
+          <a:lstStyle/>
+          <a:p>
+            <a:r>
+              <a:rPr lang="en-US" dirty="0"/>
+              <a:t>TODO: </a:t>
+            </a:r>
+          </a:p>
+          <a:p>
+            <a:pPr lvl="1"/>
+            <a:r>
+              <a:rPr lang="en-US" dirty="0"/>
+              <a:t>Assess LH movement w/ tapping</a:t>
+            </a:r>
+          </a:p>
+          <a:p>
+            <a:pPr lvl="1"/>
+            <a:r>
+              <a:rPr lang="en-US" dirty="0"/>
+              <a:t>Split by Open vs. closed first</a:t>
+            </a:r>
+          </a:p>
+        </p:txBody>
+      </p:sp>
+    </p:spTree>
+    <p:extLst>
+      <p:ext uri="{BB962C8B-B14F-4D97-AF65-F5344CB8AC3E}">
+        <p14:creationId xmlns:p14="http://schemas.microsoft.com/office/powerpoint/2010/main" val="1794372513"/>
+      </p:ext>
+    </p:extLst>
+  </p:cSld>
+  <p:clrMapOvr>
+    <a:masterClrMapping/>
+  </p:clrMapOvr>
+</p:sld>
+</file>
+
+<file path=ppt/slides/slide11.xml><?xml version="1.0" encoding="utf-8"?>
+<p:sld xmlns:a="http://schemas.openxmlformats.org/drawingml/2006/main" xmlns:r="http://schemas.openxmlformats.org/officeDocument/2006/relationships" xmlns:p="http://schemas.openxmlformats.org/presentationml/2006/main">
+  <p:cSld>
+    <p:spTree>
+      <p:nvGrpSpPr>
+        <p:cNvPr id="1" name=""/>
+        <p:cNvGrpSpPr/>
+        <p:nvPr/>
+      </p:nvGrpSpPr>
+      <p:grpSpPr>
+        <a:xfrm>
+          <a:off x="0" y="0"/>
+          <a:ext cx="0" cy="0"/>
+          <a:chOff x="0" y="0"/>
+          <a:chExt cx="0" cy="0"/>
+        </a:xfrm>
+      </p:grpSpPr>
+      <p:sp>
+        <p:nvSpPr>
+          <p:cNvPr id="2" name="Title 1"/>
+          <p:cNvSpPr>
+            <a:spLocks noGrp="1"/>
+          </p:cNvSpPr>
+          <p:nvPr>
+            <p:ph type="title"/>
+          </p:nvPr>
+        </p:nvSpPr>
+        <p:spPr/>
+        <p:txBody>
+          <a:bodyPr/>
+          <a:lstStyle/>
+          <a:p>
+            <a:r>
+              <a:rPr lang="en-US" dirty="0"/>
+              <a:t>Other Metrics</a:t>
+            </a:r>
+          </a:p>
+        </p:txBody>
+      </p:sp>
+      <p:sp>
+        <p:nvSpPr>
+          <p:cNvPr id="3" name="Content Placeholder 2"/>
+          <p:cNvSpPr>
+            <a:spLocks noGrp="1"/>
+          </p:cNvSpPr>
+          <p:nvPr>
+            <p:ph idx="1"/>
+          </p:nvPr>
+        </p:nvSpPr>
+        <p:spPr>
+          <a:xfrm>
+            <a:off x="838200" y="1825625"/>
+            <a:ext cx="3599985" cy="4351338"/>
+          </a:xfrm>
+        </p:spPr>
+        <p:txBody>
+          <a:bodyPr/>
+          <a:lstStyle/>
+          <a:p>
+            <a:r>
+              <a:rPr lang="en-US" dirty="0"/>
+              <a:t>Mood (self-reported)</a:t>
+            </a:r>
+          </a:p>
+          <a:p>
+            <a:endParaRPr lang="en-US" dirty="0"/>
+          </a:p>
+          <a:p>
+            <a:r>
+              <a:rPr lang="en-US" dirty="0"/>
+              <a:t>TODO: </a:t>
+            </a:r>
+          </a:p>
+          <a:p>
+            <a:pPr lvl="1"/>
+            <a:r>
+              <a:rPr lang="en-US" dirty="0"/>
+              <a:t>HR</a:t>
+            </a:r>
+          </a:p>
+          <a:p>
+            <a:endParaRPr lang="en-US" dirty="0"/>
+          </a:p>
+        </p:txBody>
+      </p:sp>
+      <p:pic>
+        <p:nvPicPr>
+          <p:cNvPr id="7" name="Picture 6"/>
+          <p:cNvPicPr>
+            <a:picLocks noChangeAspect="1"/>
+          </p:cNvPicPr>
+          <p:nvPr/>
+        </p:nvPicPr>
+        <p:blipFill>
+          <a:blip r:embed="rId2">
+            <a:extLst>
+              <a:ext uri="{28A0092B-C50C-407E-A947-70E740481C1C}">
+                <a14:useLocalDpi xmlns:a14="http://schemas.microsoft.com/office/drawing/2010/main" val="0"/>
+              </a:ext>
+            </a:extLst>
+          </a:blip>
+          <a:stretch>
+            <a:fillRect/>
+          </a:stretch>
+        </p:blipFill>
+        <p:spPr>
+          <a:xfrm>
+            <a:off x="5397191" y="1690688"/>
+            <a:ext cx="6565079" cy="4921358"/>
+          </a:xfrm>
+          <a:prstGeom prst="rect">
+            <a:avLst/>
+          </a:prstGeom>
+        </p:spPr>
+      </p:pic>
+      <p:sp>
+        <p:nvSpPr>
+          <p:cNvPr id="6" name="TextBox 5"/>
+          <p:cNvSpPr txBox="1"/>
+          <p:nvPr/>
+        </p:nvSpPr>
+        <p:spPr>
+          <a:xfrm>
+            <a:off x="10547153" y="1502459"/>
+            <a:ext cx="1110882" cy="646331"/>
+          </a:xfrm>
+          <a:prstGeom prst="rect">
+            <a:avLst/>
+          </a:prstGeom>
+          <a:noFill/>
+        </p:spPr>
+        <p:txBody>
+          <a:bodyPr wrap="none" rtlCol="0">
+            <a:spAutoFit/>
+          </a:bodyPr>
+          <a:lstStyle/>
+          <a:p>
+            <a:r>
+              <a:rPr lang="en-US" dirty="0">
+                <a:solidFill>
+                  <a:srgbClr val="00008F"/>
+                </a:solidFill>
+              </a:rPr>
+              <a:t>Before NF</a:t>
+            </a:r>
+          </a:p>
+          <a:p>
+            <a:r>
+              <a:rPr lang="en-US" dirty="0">
+                <a:solidFill>
+                  <a:srgbClr val="FF0000"/>
+                </a:solidFill>
+              </a:rPr>
+              <a:t>After NF</a:t>
+            </a:r>
+          </a:p>
+        </p:txBody>
+      </p:sp>
+    </p:spTree>
+    <p:extLst>
+      <p:ext uri="{BB962C8B-B14F-4D97-AF65-F5344CB8AC3E}">
+        <p14:creationId xmlns:p14="http://schemas.microsoft.com/office/powerpoint/2010/main" val="1837759236"/>
       </p:ext>
     </p:extLst>
   </p:cSld>
@@ -7260,6 +8722,716 @@
         </p:nvSpPr>
         <p:spPr/>
         <p:txBody>
+          <a:bodyPr/>
+          <a:lstStyle/>
+          <a:p>
+            <a:r>
+              <a:rPr lang="en-US" dirty="0"/>
+              <a:t>Beta Modulation to Top / Bottom Targets:</a:t>
+            </a:r>
+          </a:p>
+        </p:txBody>
+      </p:sp>
+      <p:pic>
+        <p:nvPicPr>
+          <p:cNvPr id="4" name="Picture 3"/>
+          <p:cNvPicPr>
+            <a:picLocks noChangeAspect="1"/>
+          </p:cNvPicPr>
+          <p:nvPr/>
+        </p:nvPicPr>
+        <p:blipFill>
+          <a:blip r:embed="rId2">
+            <a:extLst>
+              <a:ext uri="{28A0092B-C50C-407E-A947-70E740481C1C}">
+                <a14:useLocalDpi xmlns:a14="http://schemas.microsoft.com/office/drawing/2010/main" val="0"/>
+              </a:ext>
+            </a:extLst>
+          </a:blip>
+          <a:stretch>
+            <a:fillRect/>
+          </a:stretch>
+        </p:blipFill>
+        <p:spPr>
+          <a:xfrm>
+            <a:off x="551953" y="1555583"/>
+            <a:ext cx="5354044" cy="4013534"/>
+          </a:xfrm>
+          <a:prstGeom prst="rect">
+            <a:avLst/>
+          </a:prstGeom>
+        </p:spPr>
+      </p:pic>
+      <p:grpSp>
+        <p:nvGrpSpPr>
+          <p:cNvPr id="16" name="Group 15"/>
+          <p:cNvGrpSpPr/>
+          <p:nvPr/>
+        </p:nvGrpSpPr>
+        <p:grpSpPr>
+          <a:xfrm>
+            <a:off x="2738709" y="1839404"/>
+            <a:ext cx="328341" cy="753343"/>
+            <a:chOff x="7815533" y="2182483"/>
+            <a:chExt cx="448573" cy="1181819"/>
+          </a:xfrm>
+        </p:grpSpPr>
+        <p:sp>
+          <p:nvSpPr>
+            <p:cNvPr id="6" name="Oval 5"/>
+            <p:cNvSpPr/>
+            <p:nvPr/>
+          </p:nvSpPr>
+          <p:spPr>
+            <a:xfrm>
+              <a:off x="7910423" y="2246872"/>
+              <a:ext cx="259336" cy="259336"/>
+            </a:xfrm>
+            <a:prstGeom prst="ellipse">
+              <a:avLst/>
+            </a:prstGeom>
+            <a:solidFill>
+              <a:srgbClr val="4682B4"/>
+            </a:solidFill>
+            <a:ln>
+              <a:noFill/>
+            </a:ln>
+          </p:spPr>
+          <p:style>
+            <a:lnRef idx="2">
+              <a:schemeClr val="accent1">
+                <a:shade val="50000"/>
+              </a:schemeClr>
+            </a:lnRef>
+            <a:fillRef idx="1">
+              <a:schemeClr val="accent1"/>
+            </a:fillRef>
+            <a:effectRef idx="0">
+              <a:schemeClr val="accent1"/>
+            </a:effectRef>
+            <a:fontRef idx="minor">
+              <a:schemeClr val="lt1"/>
+            </a:fontRef>
+          </p:style>
+          <p:txBody>
+            <a:bodyPr rtlCol="0" anchor="ctr"/>
+            <a:lstStyle/>
+            <a:p>
+              <a:pPr algn="ctr"/>
+              <a:endParaRPr lang="en-US" dirty="0"/>
+            </a:p>
+          </p:txBody>
+        </p:sp>
+        <p:sp>
+          <p:nvSpPr>
+            <p:cNvPr id="7" name="Oval 6"/>
+            <p:cNvSpPr/>
+            <p:nvPr/>
+          </p:nvSpPr>
+          <p:spPr>
+            <a:xfrm>
+              <a:off x="7910423" y="3028500"/>
+              <a:ext cx="259336" cy="259336"/>
+            </a:xfrm>
+            <a:prstGeom prst="ellipse">
+              <a:avLst/>
+            </a:prstGeom>
+            <a:solidFill>
+              <a:srgbClr val="20B2AA">
+                <a:alpha val="40000"/>
+              </a:srgbClr>
+            </a:solidFill>
+            <a:ln>
+              <a:noFill/>
+            </a:ln>
+          </p:spPr>
+          <p:style>
+            <a:lnRef idx="2">
+              <a:schemeClr val="accent1">
+                <a:shade val="50000"/>
+              </a:schemeClr>
+            </a:lnRef>
+            <a:fillRef idx="1">
+              <a:schemeClr val="accent1"/>
+            </a:fillRef>
+            <a:effectRef idx="0">
+              <a:schemeClr val="accent1"/>
+            </a:effectRef>
+            <a:fontRef idx="minor">
+              <a:schemeClr val="lt1"/>
+            </a:fontRef>
+          </p:style>
+          <p:txBody>
+            <a:bodyPr rtlCol="0" anchor="ctr"/>
+            <a:lstStyle/>
+            <a:p>
+              <a:pPr algn="ctr"/>
+              <a:endParaRPr lang="en-US"/>
+            </a:p>
+          </p:txBody>
+        </p:sp>
+        <p:sp>
+          <p:nvSpPr>
+            <p:cNvPr id="8" name="Oval 7"/>
+            <p:cNvSpPr/>
+            <p:nvPr/>
+          </p:nvSpPr>
+          <p:spPr>
+            <a:xfrm>
+              <a:off x="7910423" y="2618708"/>
+              <a:ext cx="259336" cy="259336"/>
+            </a:xfrm>
+            <a:prstGeom prst="ellipse">
+              <a:avLst/>
+            </a:prstGeom>
+            <a:solidFill>
+              <a:schemeClr val="tx1">
+                <a:alpha val="40000"/>
+              </a:schemeClr>
+            </a:solidFill>
+            <a:ln>
+              <a:noFill/>
+            </a:ln>
+          </p:spPr>
+          <p:style>
+            <a:lnRef idx="2">
+              <a:schemeClr val="accent1">
+                <a:shade val="50000"/>
+              </a:schemeClr>
+            </a:lnRef>
+            <a:fillRef idx="1">
+              <a:schemeClr val="accent1"/>
+            </a:fillRef>
+            <a:effectRef idx="0">
+              <a:schemeClr val="accent1"/>
+            </a:effectRef>
+            <a:fontRef idx="minor">
+              <a:schemeClr val="lt1"/>
+            </a:fontRef>
+          </p:style>
+          <p:txBody>
+            <a:bodyPr rtlCol="0" anchor="ctr"/>
+            <a:lstStyle/>
+            <a:p>
+              <a:pPr algn="ctr"/>
+              <a:endParaRPr lang="en-US"/>
+            </a:p>
+          </p:txBody>
+        </p:sp>
+        <p:sp>
+          <p:nvSpPr>
+            <p:cNvPr id="9" name="Oval 8"/>
+            <p:cNvSpPr/>
+            <p:nvPr/>
+          </p:nvSpPr>
+          <p:spPr>
+            <a:xfrm>
+              <a:off x="7960179" y="2421613"/>
+              <a:ext cx="159823" cy="159823"/>
+            </a:xfrm>
+            <a:prstGeom prst="ellipse">
+              <a:avLst/>
+            </a:prstGeom>
+            <a:solidFill>
+              <a:srgbClr val="FF0000"/>
+            </a:solidFill>
+            <a:ln>
+              <a:noFill/>
+            </a:ln>
+          </p:spPr>
+          <p:style>
+            <a:lnRef idx="2">
+              <a:schemeClr val="accent1">
+                <a:shade val="50000"/>
+              </a:schemeClr>
+            </a:lnRef>
+            <a:fillRef idx="1">
+              <a:schemeClr val="accent1"/>
+            </a:fillRef>
+            <a:effectRef idx="0">
+              <a:schemeClr val="accent1"/>
+            </a:effectRef>
+            <a:fontRef idx="minor">
+              <a:schemeClr val="lt1"/>
+            </a:fontRef>
+          </p:style>
+          <p:txBody>
+            <a:bodyPr rtlCol="0" anchor="ctr"/>
+            <a:lstStyle/>
+            <a:p>
+              <a:pPr algn="ctr"/>
+              <a:endParaRPr lang="en-US"/>
+            </a:p>
+          </p:txBody>
+        </p:sp>
+        <p:sp>
+          <p:nvSpPr>
+            <p:cNvPr id="10" name="Rectangle 9"/>
+            <p:cNvSpPr/>
+            <p:nvPr/>
+          </p:nvSpPr>
+          <p:spPr>
+            <a:xfrm>
+              <a:off x="7815533" y="2182483"/>
+              <a:ext cx="448573" cy="1181819"/>
+            </a:xfrm>
+            <a:prstGeom prst="rect">
+              <a:avLst/>
+            </a:prstGeom>
+            <a:noFill/>
+            <a:ln>
+              <a:solidFill>
+                <a:schemeClr val="tx1"/>
+              </a:solidFill>
+            </a:ln>
+          </p:spPr>
+          <p:style>
+            <a:lnRef idx="2">
+              <a:schemeClr val="accent1">
+                <a:shade val="50000"/>
+              </a:schemeClr>
+            </a:lnRef>
+            <a:fillRef idx="1">
+              <a:schemeClr val="accent1"/>
+            </a:fillRef>
+            <a:effectRef idx="0">
+              <a:schemeClr val="accent1"/>
+            </a:effectRef>
+            <a:fontRef idx="minor">
+              <a:schemeClr val="lt1"/>
+            </a:fontRef>
+          </p:style>
+          <p:txBody>
+            <a:bodyPr rtlCol="0" anchor="ctr"/>
+            <a:lstStyle/>
+            <a:p>
+              <a:pPr algn="ctr"/>
+              <a:endParaRPr lang="en-US"/>
+            </a:p>
+          </p:txBody>
+        </p:sp>
+      </p:grpSp>
+      <p:grpSp>
+        <p:nvGrpSpPr>
+          <p:cNvPr id="17" name="Group 16"/>
+          <p:cNvGrpSpPr/>
+          <p:nvPr/>
+        </p:nvGrpSpPr>
+        <p:grpSpPr>
+          <a:xfrm>
+            <a:off x="2352226" y="4248150"/>
+            <a:ext cx="315044" cy="776711"/>
+            <a:chOff x="7815533" y="4258574"/>
+            <a:chExt cx="448573" cy="1181819"/>
+          </a:xfrm>
+        </p:grpSpPr>
+        <p:sp>
+          <p:nvSpPr>
+            <p:cNvPr id="11" name="Oval 10"/>
+            <p:cNvSpPr/>
+            <p:nvPr/>
+          </p:nvSpPr>
+          <p:spPr>
+            <a:xfrm>
+              <a:off x="7910423" y="4322963"/>
+              <a:ext cx="259336" cy="259336"/>
+            </a:xfrm>
+            <a:prstGeom prst="ellipse">
+              <a:avLst/>
+            </a:prstGeom>
+            <a:solidFill>
+              <a:srgbClr val="4682B4">
+                <a:alpha val="40000"/>
+              </a:srgbClr>
+            </a:solidFill>
+            <a:ln>
+              <a:noFill/>
+            </a:ln>
+          </p:spPr>
+          <p:style>
+            <a:lnRef idx="2">
+              <a:schemeClr val="accent1">
+                <a:shade val="50000"/>
+              </a:schemeClr>
+            </a:lnRef>
+            <a:fillRef idx="1">
+              <a:schemeClr val="accent1"/>
+            </a:fillRef>
+            <a:effectRef idx="0">
+              <a:schemeClr val="accent1"/>
+            </a:effectRef>
+            <a:fontRef idx="minor">
+              <a:schemeClr val="lt1"/>
+            </a:fontRef>
+          </p:style>
+          <p:txBody>
+            <a:bodyPr rtlCol="0" anchor="ctr"/>
+            <a:lstStyle/>
+            <a:p>
+              <a:pPr algn="ctr"/>
+              <a:endParaRPr lang="en-US" dirty="0"/>
+            </a:p>
+          </p:txBody>
+        </p:sp>
+        <p:sp>
+          <p:nvSpPr>
+            <p:cNvPr id="12" name="Oval 11"/>
+            <p:cNvSpPr/>
+            <p:nvPr/>
+          </p:nvSpPr>
+          <p:spPr>
+            <a:xfrm>
+              <a:off x="7910423" y="5104591"/>
+              <a:ext cx="259336" cy="259336"/>
+            </a:xfrm>
+            <a:prstGeom prst="ellipse">
+              <a:avLst/>
+            </a:prstGeom>
+            <a:solidFill>
+              <a:srgbClr val="20B2AA"/>
+            </a:solidFill>
+            <a:ln>
+              <a:noFill/>
+            </a:ln>
+          </p:spPr>
+          <p:style>
+            <a:lnRef idx="2">
+              <a:schemeClr val="accent1">
+                <a:shade val="50000"/>
+              </a:schemeClr>
+            </a:lnRef>
+            <a:fillRef idx="1">
+              <a:schemeClr val="accent1"/>
+            </a:fillRef>
+            <a:effectRef idx="0">
+              <a:schemeClr val="accent1"/>
+            </a:effectRef>
+            <a:fontRef idx="minor">
+              <a:schemeClr val="lt1"/>
+            </a:fontRef>
+          </p:style>
+          <p:txBody>
+            <a:bodyPr rtlCol="0" anchor="ctr"/>
+            <a:lstStyle/>
+            <a:p>
+              <a:pPr algn="ctr"/>
+              <a:endParaRPr lang="en-US"/>
+            </a:p>
+          </p:txBody>
+        </p:sp>
+        <p:sp>
+          <p:nvSpPr>
+            <p:cNvPr id="13" name="Oval 12"/>
+            <p:cNvSpPr/>
+            <p:nvPr/>
+          </p:nvSpPr>
+          <p:spPr>
+            <a:xfrm>
+              <a:off x="7910423" y="4694799"/>
+              <a:ext cx="259336" cy="259336"/>
+            </a:xfrm>
+            <a:prstGeom prst="ellipse">
+              <a:avLst/>
+            </a:prstGeom>
+            <a:solidFill>
+              <a:schemeClr val="tx1">
+                <a:alpha val="40000"/>
+              </a:schemeClr>
+            </a:solidFill>
+            <a:ln>
+              <a:noFill/>
+            </a:ln>
+          </p:spPr>
+          <p:style>
+            <a:lnRef idx="2">
+              <a:schemeClr val="accent1">
+                <a:shade val="50000"/>
+              </a:schemeClr>
+            </a:lnRef>
+            <a:fillRef idx="1">
+              <a:schemeClr val="accent1"/>
+            </a:fillRef>
+            <a:effectRef idx="0">
+              <a:schemeClr val="accent1"/>
+            </a:effectRef>
+            <a:fontRef idx="minor">
+              <a:schemeClr val="lt1"/>
+            </a:fontRef>
+          </p:style>
+          <p:txBody>
+            <a:bodyPr rtlCol="0" anchor="ctr"/>
+            <a:lstStyle/>
+            <a:p>
+              <a:pPr algn="ctr"/>
+              <a:endParaRPr lang="en-US"/>
+            </a:p>
+          </p:txBody>
+        </p:sp>
+        <p:sp>
+          <p:nvSpPr>
+            <p:cNvPr id="14" name="Oval 13"/>
+            <p:cNvSpPr/>
+            <p:nvPr/>
+          </p:nvSpPr>
+          <p:spPr>
+            <a:xfrm>
+              <a:off x="7960179" y="5104591"/>
+              <a:ext cx="159823" cy="159823"/>
+            </a:xfrm>
+            <a:prstGeom prst="ellipse">
+              <a:avLst/>
+            </a:prstGeom>
+            <a:solidFill>
+              <a:srgbClr val="FF0000"/>
+            </a:solidFill>
+            <a:ln>
+              <a:noFill/>
+            </a:ln>
+          </p:spPr>
+          <p:style>
+            <a:lnRef idx="2">
+              <a:schemeClr val="accent1">
+                <a:shade val="50000"/>
+              </a:schemeClr>
+            </a:lnRef>
+            <a:fillRef idx="1">
+              <a:schemeClr val="accent1"/>
+            </a:fillRef>
+            <a:effectRef idx="0">
+              <a:schemeClr val="accent1"/>
+            </a:effectRef>
+            <a:fontRef idx="minor">
+              <a:schemeClr val="lt1"/>
+            </a:fontRef>
+          </p:style>
+          <p:txBody>
+            <a:bodyPr rtlCol="0" anchor="ctr"/>
+            <a:lstStyle/>
+            <a:p>
+              <a:pPr algn="ctr"/>
+              <a:endParaRPr lang="en-US"/>
+            </a:p>
+          </p:txBody>
+        </p:sp>
+        <p:sp>
+          <p:nvSpPr>
+            <p:cNvPr id="15" name="Rectangle 14"/>
+            <p:cNvSpPr/>
+            <p:nvPr/>
+          </p:nvSpPr>
+          <p:spPr>
+            <a:xfrm>
+              <a:off x="7815533" y="4258574"/>
+              <a:ext cx="448573" cy="1181819"/>
+            </a:xfrm>
+            <a:prstGeom prst="rect">
+              <a:avLst/>
+            </a:prstGeom>
+            <a:noFill/>
+            <a:ln>
+              <a:solidFill>
+                <a:schemeClr val="tx1"/>
+              </a:solidFill>
+            </a:ln>
+          </p:spPr>
+          <p:style>
+            <a:lnRef idx="2">
+              <a:schemeClr val="accent1">
+                <a:shade val="50000"/>
+              </a:schemeClr>
+            </a:lnRef>
+            <a:fillRef idx="1">
+              <a:schemeClr val="accent1"/>
+            </a:fillRef>
+            <a:effectRef idx="0">
+              <a:schemeClr val="accent1"/>
+            </a:effectRef>
+            <a:fontRef idx="minor">
+              <a:schemeClr val="lt1"/>
+            </a:fontRef>
+          </p:style>
+          <p:txBody>
+            <a:bodyPr rtlCol="0" anchor="ctr"/>
+            <a:lstStyle/>
+            <a:p>
+              <a:pPr algn="ctr"/>
+              <a:endParaRPr lang="en-US"/>
+            </a:p>
+          </p:txBody>
+        </p:sp>
+      </p:grpSp>
+      <p:grpSp>
+        <p:nvGrpSpPr>
+          <p:cNvPr id="21" name="Group 20"/>
+          <p:cNvGrpSpPr/>
+          <p:nvPr/>
+        </p:nvGrpSpPr>
+        <p:grpSpPr>
+          <a:xfrm>
+            <a:off x="6620754" y="2045760"/>
+            <a:ext cx="4920387" cy="3079935"/>
+            <a:chOff x="6906505" y="2282785"/>
+            <a:chExt cx="4212058" cy="2636554"/>
+          </a:xfrm>
+        </p:grpSpPr>
+        <p:pic>
+          <p:nvPicPr>
+            <p:cNvPr id="18" name="Picture 17"/>
+            <p:cNvPicPr>
+              <a:picLocks noChangeAspect="1"/>
+            </p:cNvPicPr>
+            <p:nvPr/>
+          </p:nvPicPr>
+          <p:blipFill rotWithShape="1">
+            <a:blip r:embed="rId3"/>
+            <a:srcRect l="47672" t="53333" b="22500"/>
+            <a:stretch/>
+          </p:blipFill>
+          <p:spPr>
+            <a:xfrm>
+              <a:off x="6906505" y="2282785"/>
+              <a:ext cx="4212058" cy="2517850"/>
+            </a:xfrm>
+            <a:prstGeom prst="rect">
+              <a:avLst/>
+            </a:prstGeom>
+          </p:spPr>
+        </p:pic>
+        <p:sp>
+          <p:nvSpPr>
+            <p:cNvPr id="19" name="Rectangle 18"/>
+            <p:cNvSpPr/>
+            <p:nvPr/>
+          </p:nvSpPr>
+          <p:spPr>
+            <a:xfrm>
+              <a:off x="6906505" y="2378692"/>
+              <a:ext cx="332495" cy="214055"/>
+            </a:xfrm>
+            <a:prstGeom prst="rect">
+              <a:avLst/>
+            </a:prstGeom>
+            <a:solidFill>
+              <a:schemeClr val="bg1"/>
+            </a:solidFill>
+            <a:ln>
+              <a:noFill/>
+            </a:ln>
+          </p:spPr>
+          <p:style>
+            <a:lnRef idx="2">
+              <a:schemeClr val="accent1">
+                <a:shade val="50000"/>
+              </a:schemeClr>
+            </a:lnRef>
+            <a:fillRef idx="1">
+              <a:schemeClr val="accent1"/>
+            </a:fillRef>
+            <a:effectRef idx="0">
+              <a:schemeClr val="accent1"/>
+            </a:effectRef>
+            <a:fontRef idx="minor">
+              <a:schemeClr val="lt1"/>
+            </a:fontRef>
+          </p:style>
+          <p:txBody>
+            <a:bodyPr rtlCol="0" anchor="ctr"/>
+            <a:lstStyle/>
+            <a:p>
+              <a:pPr algn="ctr"/>
+              <a:endParaRPr lang="en-US"/>
+            </a:p>
+          </p:txBody>
+        </p:sp>
+        <p:sp>
+          <p:nvSpPr>
+            <p:cNvPr id="20" name="Rectangle 19"/>
+            <p:cNvSpPr/>
+            <p:nvPr/>
+          </p:nvSpPr>
+          <p:spPr>
+            <a:xfrm>
+              <a:off x="7026618" y="4705284"/>
+              <a:ext cx="332495" cy="214055"/>
+            </a:xfrm>
+            <a:prstGeom prst="rect">
+              <a:avLst/>
+            </a:prstGeom>
+            <a:solidFill>
+              <a:schemeClr val="bg1"/>
+            </a:solidFill>
+            <a:ln>
+              <a:noFill/>
+            </a:ln>
+          </p:spPr>
+          <p:style>
+            <a:lnRef idx="2">
+              <a:schemeClr val="accent1">
+                <a:shade val="50000"/>
+              </a:schemeClr>
+            </a:lnRef>
+            <a:fillRef idx="1">
+              <a:schemeClr val="accent1"/>
+            </a:fillRef>
+            <a:effectRef idx="0">
+              <a:schemeClr val="accent1"/>
+            </a:effectRef>
+            <a:fontRef idx="minor">
+              <a:schemeClr val="lt1"/>
+            </a:fontRef>
+          </p:style>
+          <p:txBody>
+            <a:bodyPr rtlCol="0" anchor="ctr"/>
+            <a:lstStyle/>
+            <a:p>
+              <a:pPr algn="ctr"/>
+              <a:endParaRPr lang="en-US"/>
+            </a:p>
+          </p:txBody>
+        </p:sp>
+      </p:grpSp>
+    </p:spTree>
+    <p:extLst>
+      <p:ext uri="{BB962C8B-B14F-4D97-AF65-F5344CB8AC3E}">
+        <p14:creationId xmlns:p14="http://schemas.microsoft.com/office/powerpoint/2010/main" val="2451553073"/>
+      </p:ext>
+    </p:extLst>
+  </p:cSld>
+  <p:clrMapOvr>
+    <a:masterClrMapping/>
+  </p:clrMapOvr>
+</p:sld>
+</file>
+
+<file path=ppt/slides/slide8.xml><?xml version="1.0" encoding="utf-8"?>
+<p:sld xmlns:a="http://schemas.openxmlformats.org/drawingml/2006/main" xmlns:r="http://schemas.openxmlformats.org/officeDocument/2006/relationships" xmlns:p="http://schemas.openxmlformats.org/presentationml/2006/main">
+  <p:cSld>
+    <p:spTree>
+      <p:nvGrpSpPr>
+        <p:cNvPr id="1" name=""/>
+        <p:cNvGrpSpPr/>
+        <p:nvPr/>
+      </p:nvGrpSpPr>
+      <p:grpSpPr>
+        <a:xfrm>
+          <a:off x="0" y="0"/>
+          <a:ext cx="0" cy="0"/>
+          <a:chOff x="0" y="0"/>
+          <a:chExt cx="0" cy="0"/>
+        </a:xfrm>
+      </p:grpSpPr>
+      <p:sp>
+        <p:nvSpPr>
+          <p:cNvPr id="2" name="Title 1"/>
+          <p:cNvSpPr>
+            <a:spLocks noGrp="1"/>
+          </p:cNvSpPr>
+          <p:nvPr>
+            <p:ph type="title"/>
+          </p:nvPr>
+        </p:nvSpPr>
+        <p:spPr/>
+        <p:txBody>
           <a:bodyPr>
             <a:normAutofit/>
           </a:bodyPr>
@@ -7534,6 +9706,276 @@
     <p:extLst>
       <p:ext uri="{BB962C8B-B14F-4D97-AF65-F5344CB8AC3E}">
         <p14:creationId xmlns:p14="http://schemas.microsoft.com/office/powerpoint/2010/main" val="7753780"/>
+      </p:ext>
+    </p:extLst>
+  </p:cSld>
+  <p:clrMapOvr>
+    <a:masterClrMapping/>
+  </p:clrMapOvr>
+</p:sld>
+</file>
+
+<file path=ppt/slides/slide9.xml><?xml version="1.0" encoding="utf-8"?>
+<p:sld xmlns:a="http://schemas.openxmlformats.org/drawingml/2006/main" xmlns:r="http://schemas.openxmlformats.org/officeDocument/2006/relationships" xmlns:p="http://schemas.openxmlformats.org/presentationml/2006/main">
+  <p:cSld>
+    <p:spTree>
+      <p:nvGrpSpPr>
+        <p:cNvPr id="1" name=""/>
+        <p:cNvGrpSpPr/>
+        <p:nvPr/>
+      </p:nvGrpSpPr>
+      <p:grpSpPr>
+        <a:xfrm>
+          <a:off x="0" y="0"/>
+          <a:ext cx="0" cy="0"/>
+          <a:chOff x="0" y="0"/>
+          <a:chExt cx="0" cy="0"/>
+        </a:xfrm>
+      </p:grpSpPr>
+      <p:sp>
+        <p:nvSpPr>
+          <p:cNvPr id="2" name="Title 1"/>
+          <p:cNvSpPr>
+            <a:spLocks noGrp="1"/>
+          </p:cNvSpPr>
+          <p:nvPr>
+            <p:ph type="title"/>
+          </p:nvPr>
+        </p:nvSpPr>
+        <p:spPr/>
+        <p:txBody>
+          <a:bodyPr/>
+          <a:lstStyle/>
+          <a:p>
+            <a:pPr algn="ctr"/>
+            <a:r>
+              <a:rPr lang="en-US" dirty="0"/>
+              <a:t>What About STN: Unlocks M1? </a:t>
+            </a:r>
+          </a:p>
+        </p:txBody>
+      </p:sp>
+      <p:pic>
+        <p:nvPicPr>
+          <p:cNvPr id="5" name="Picture 4"/>
+          <p:cNvPicPr>
+            <a:picLocks noChangeAspect="1"/>
+          </p:cNvPicPr>
+          <p:nvPr/>
+        </p:nvPicPr>
+        <p:blipFill rotWithShape="1">
+          <a:blip r:embed="rId3">
+            <a:extLst>
+              <a:ext uri="{28A0092B-C50C-407E-A947-70E740481C1C}">
+                <a14:useLocalDpi xmlns:a14="http://schemas.microsoft.com/office/drawing/2010/main" val="0"/>
+              </a:ext>
+            </a:extLst>
+          </a:blip>
+          <a:srcRect t="34166" b="35556"/>
+          <a:stretch/>
+        </p:blipFill>
+        <p:spPr>
+          <a:xfrm>
+            <a:off x="4236228" y="1412016"/>
+            <a:ext cx="3975195" cy="2275934"/>
+          </a:xfrm>
+          <a:prstGeom prst="rect">
+            <a:avLst/>
+          </a:prstGeom>
+        </p:spPr>
+      </p:pic>
+      <p:pic>
+        <p:nvPicPr>
+          <p:cNvPr id="6" name="Picture 5"/>
+          <p:cNvPicPr>
+            <a:picLocks noChangeAspect="1"/>
+          </p:cNvPicPr>
+          <p:nvPr/>
+        </p:nvPicPr>
+        <p:blipFill rotWithShape="1">
+          <a:blip r:embed="rId3">
+            <a:extLst>
+              <a:ext uri="{28A0092B-C50C-407E-A947-70E740481C1C}">
+                <a14:useLocalDpi xmlns:a14="http://schemas.microsoft.com/office/drawing/2010/main" val="0"/>
+              </a:ext>
+            </a:extLst>
+          </a:blip>
+          <a:srcRect b="65833"/>
+          <a:stretch/>
+        </p:blipFill>
+        <p:spPr>
+          <a:xfrm>
+            <a:off x="267064" y="1119694"/>
+            <a:ext cx="3975195" cy="2568256"/>
+          </a:xfrm>
+          <a:prstGeom prst="rect">
+            <a:avLst/>
+          </a:prstGeom>
+        </p:spPr>
+      </p:pic>
+      <p:pic>
+        <p:nvPicPr>
+          <p:cNvPr id="7" name="Picture 6"/>
+          <p:cNvPicPr>
+            <a:picLocks noChangeAspect="1"/>
+          </p:cNvPicPr>
+          <p:nvPr/>
+        </p:nvPicPr>
+        <p:blipFill rotWithShape="1">
+          <a:blip r:embed="rId3">
+            <a:extLst>
+              <a:ext uri="{28A0092B-C50C-407E-A947-70E740481C1C}">
+                <a14:useLocalDpi xmlns:a14="http://schemas.microsoft.com/office/drawing/2010/main" val="0"/>
+              </a:ext>
+            </a:extLst>
+          </a:blip>
+          <a:srcRect t="64096" b="5626"/>
+          <a:stretch/>
+        </p:blipFill>
+        <p:spPr>
+          <a:xfrm>
+            <a:off x="8216804" y="1412016"/>
+            <a:ext cx="3975196" cy="2275934"/>
+          </a:xfrm>
+          <a:prstGeom prst="rect">
+            <a:avLst/>
+          </a:prstGeom>
+        </p:spPr>
+      </p:pic>
+      <p:sp>
+        <p:nvSpPr>
+          <p:cNvPr id="9" name="TextBox 8"/>
+          <p:cNvSpPr txBox="1"/>
+          <p:nvPr/>
+        </p:nvSpPr>
+        <p:spPr>
+          <a:xfrm>
+            <a:off x="516177" y="3802791"/>
+            <a:ext cx="11159646" cy="2862322"/>
+          </a:xfrm>
+          <a:prstGeom prst="rect">
+            <a:avLst/>
+          </a:prstGeom>
+          <a:noFill/>
+        </p:spPr>
+        <p:txBody>
+          <a:bodyPr wrap="square" rtlCol="0">
+            <a:spAutoFit/>
+          </a:bodyPr>
+          <a:lstStyle/>
+          <a:p>
+            <a:r>
+              <a:rPr lang="en-US" dirty="0"/>
+              <a:t>Background: </a:t>
+            </a:r>
+          </a:p>
+          <a:p>
+            <a:pPr marL="285750" indent="-285750">
+              <a:buFontTx/>
+              <a:buChar char="-"/>
+            </a:pPr>
+            <a:r>
+              <a:rPr lang="en-US" dirty="0"/>
+              <a:t>M1 leads STN in Beta oscillations</a:t>
+            </a:r>
+          </a:p>
+          <a:p>
+            <a:pPr marL="285750" indent="-285750">
+              <a:buFontTx/>
+              <a:buChar char="-"/>
+            </a:pPr>
+            <a:endParaRPr lang="en-US" dirty="0"/>
+          </a:p>
+          <a:p>
+            <a:pPr marL="285750" indent="-285750">
+              <a:buFontTx/>
+              <a:buChar char="-"/>
+            </a:pPr>
+            <a:r>
+              <a:rPr lang="en-US" dirty="0"/>
+              <a:t>Apparent paradox:  </a:t>
+            </a:r>
+            <a:r>
+              <a:rPr lang="en-US" dirty="0"/>
+              <a:t>Levodopa therapy reduces beta power in STN but does not change power in M1</a:t>
+            </a:r>
+          </a:p>
+          <a:p>
+            <a:pPr marL="742950" lvl="1" indent="-285750">
+              <a:buFontTx/>
+              <a:buChar char="-"/>
+            </a:pPr>
+            <a:r>
+              <a:rPr lang="en-US" dirty="0"/>
+              <a:t>dopamine suppresses transmission of hyper-synchronous cortical events to the STN–</a:t>
+            </a:r>
+            <a:r>
+              <a:rPr lang="en-US" dirty="0" err="1"/>
+              <a:t>globus</a:t>
+            </a:r>
+            <a:r>
+              <a:rPr lang="en-US" dirty="0"/>
+              <a:t> pallidus network</a:t>
+            </a:r>
+          </a:p>
+          <a:p>
+            <a:pPr marL="742950" lvl="1" indent="-285750">
+              <a:buFontTx/>
+              <a:buChar char="-"/>
+            </a:pPr>
+            <a:r>
+              <a:rPr lang="en-US" dirty="0"/>
+              <a:t>Beta frequencies: M1 movement related beta is usually higher than levodopa-related beta reduction</a:t>
+            </a:r>
+          </a:p>
+          <a:p>
+            <a:pPr marL="742950" lvl="1" indent="-285750">
+              <a:buFontTx/>
+              <a:buChar char="-"/>
+            </a:pPr>
+            <a:endParaRPr lang="en-US" dirty="0"/>
+          </a:p>
+          <a:p>
+            <a:pPr marL="285750" indent="-285750">
+              <a:buFontTx/>
+              <a:buChar char="-"/>
+            </a:pPr>
+            <a:r>
+              <a:rPr lang="en-US" dirty="0"/>
+              <a:t>Variable STN beta power reflects a cortico-</a:t>
+            </a:r>
+            <a:r>
+              <a:rPr lang="en-US" dirty="0" err="1"/>
+              <a:t>thalamo</a:t>
+            </a:r>
+            <a:r>
+              <a:rPr lang="en-US" dirty="0"/>
+              <a:t>-basal ganglia system that is less hyper synchronized </a:t>
+            </a:r>
+          </a:p>
+          <a:p>
+            <a:pPr marL="285750" indent="-285750">
+              <a:buFontTx/>
+              <a:buChar char="-"/>
+            </a:pPr>
+            <a:endParaRPr lang="en-US" dirty="0"/>
+          </a:p>
+          <a:p>
+            <a:pPr marL="285750" indent="-285750">
+              <a:buFontTx/>
+              <a:buChar char="-"/>
+            </a:pPr>
+            <a:r>
+              <a:rPr lang="en-US" dirty="0"/>
+              <a:t>Weak correlation with M1 beta desynchronization</a:t>
+            </a:r>
+          </a:p>
+        </p:txBody>
+      </p:sp>
+    </p:spTree>
+    <p:extLst>
+      <p:ext uri="{BB962C8B-B14F-4D97-AF65-F5344CB8AC3E}">
+        <p14:creationId xmlns:p14="http://schemas.microsoft.com/office/powerpoint/2010/main" val="1963586836"/>
       </p:ext>
     </p:extLst>
   </p:cSld>
@@ -7836,4 +10278,299 @@
     </a:ext>
   </a:extLst>
 </a:theme>
+</file>
+
+<file path=ppt/theme/theme2.xml><?xml version="1.0" encoding="utf-8"?>
+<a:theme xmlns:a="http://schemas.openxmlformats.org/drawingml/2006/main" name="Office Theme">
+  <a:themeElements>
+    <a:clrScheme name="Office">
+      <a:dk1>
+        <a:sysClr val="windowText" lastClr="000000"/>
+      </a:dk1>
+      <a:lt1>
+        <a:sysClr val="window" lastClr="FFFFFF"/>
+      </a:lt1>
+      <a:dk2>
+        <a:srgbClr val="44546A"/>
+      </a:dk2>
+      <a:lt2>
+        <a:srgbClr val="E7E6E6"/>
+      </a:lt2>
+      <a:accent1>
+        <a:srgbClr val="4472C4"/>
+      </a:accent1>
+      <a:accent2>
+        <a:srgbClr val="ED7D31"/>
+      </a:accent2>
+      <a:accent3>
+        <a:srgbClr val="A5A5A5"/>
+      </a:accent3>
+      <a:accent4>
+        <a:srgbClr val="FFC000"/>
+      </a:accent4>
+      <a:accent5>
+        <a:srgbClr val="5B9BD5"/>
+      </a:accent5>
+      <a:accent6>
+        <a:srgbClr val="70AD47"/>
+      </a:accent6>
+      <a:hlink>
+        <a:srgbClr val="0563C1"/>
+      </a:hlink>
+      <a:folHlink>
+        <a:srgbClr val="954F72"/>
+      </a:folHlink>
+    </a:clrScheme>
+    <a:fontScheme name="Office">
+      <a:majorFont>
+        <a:latin typeface="Calibri Light" panose="020F0302020204030204"/>
+        <a:ea typeface=""/>
+        <a:cs typeface=""/>
+        <a:font script="Jpan" typeface="游ゴシック Light"/>
+        <a:font script="Hang" typeface="맑은 고딕"/>
+        <a:font script="Hans" typeface="等线 Light"/>
+        <a:font script="Hant" typeface="新細明體"/>
+        <a:font script="Arab" typeface="Times New Roman"/>
+        <a:font script="Hebr" typeface="Times New Roman"/>
+        <a:font script="Thai" typeface="Angsana New"/>
+        <a:font script="Ethi" typeface="Nyala"/>
+        <a:font script="Beng" typeface="Vrinda"/>
+        <a:font script="Gujr" typeface="Shruti"/>
+        <a:font script="Khmr" typeface="MoolBoran"/>
+        <a:font script="Knda" typeface="Tunga"/>
+        <a:font script="Guru" typeface="Raavi"/>
+        <a:font script="Cans" typeface="Euphemia"/>
+        <a:font script="Cher" typeface="Plantagenet Cherokee"/>
+        <a:font script="Yiii" typeface="Microsoft Yi Baiti"/>
+        <a:font script="Tibt" typeface="Microsoft Himalaya"/>
+        <a:font script="Thaa" typeface="MV Boli"/>
+        <a:font script="Deva" typeface="Mangal"/>
+        <a:font script="Telu" typeface="Gautami"/>
+        <a:font script="Taml" typeface="Latha"/>
+        <a:font script="Syrc" typeface="Estrangelo Edessa"/>
+        <a:font script="Orya" typeface="Kalinga"/>
+        <a:font script="Mlym" typeface="Kartika"/>
+        <a:font script="Laoo" typeface="DokChampa"/>
+        <a:font script="Sinh" typeface="Iskoola Pota"/>
+        <a:font script="Mong" typeface="Mongolian Baiti"/>
+        <a:font script="Viet" typeface="Times New Roman"/>
+        <a:font script="Uigh" typeface="Microsoft Uighur"/>
+        <a:font script="Geor" typeface="Sylfaen"/>
+        <a:font script="Armn" typeface="Arial"/>
+        <a:font script="Bugi" typeface="Leelawadee UI"/>
+        <a:font script="Bopo" typeface="Microsoft JhengHei"/>
+        <a:font script="Java" typeface="Javanese Text"/>
+        <a:font script="Lisu" typeface="Segoe UI"/>
+        <a:font script="Mymr" typeface="Myanmar Text"/>
+        <a:font script="Nkoo" typeface="Ebrima"/>
+        <a:font script="Olck" typeface="Nirmala UI"/>
+        <a:font script="Osma" typeface="Ebrima"/>
+        <a:font script="Phag" typeface="Phagspa"/>
+        <a:font script="Syrn" typeface="Estrangelo Edessa"/>
+        <a:font script="Syrj" typeface="Estrangelo Edessa"/>
+        <a:font script="Syre" typeface="Estrangelo Edessa"/>
+        <a:font script="Sora" typeface="Nirmala UI"/>
+        <a:font script="Tale" typeface="Microsoft Tai Le"/>
+        <a:font script="Talu" typeface="Microsoft New Tai Lue"/>
+        <a:font script="Tfng" typeface="Ebrima"/>
+      </a:majorFont>
+      <a:minorFont>
+        <a:latin typeface="Calibri" panose="020F0502020204030204"/>
+        <a:ea typeface=""/>
+        <a:cs typeface=""/>
+        <a:font script="Jpan" typeface="游ゴシック"/>
+        <a:font script="Hang" typeface="맑은 고딕"/>
+        <a:font script="Hans" typeface="等线"/>
+        <a:font script="Hant" typeface="新細明體"/>
+        <a:font script="Arab" typeface="Arial"/>
+        <a:font script="Hebr" typeface="Arial"/>
+        <a:font script="Thai" typeface="Cordia New"/>
+        <a:font script="Ethi" typeface="Nyala"/>
+        <a:font script="Beng" typeface="Vrinda"/>
+        <a:font script="Gujr" typeface="Shruti"/>
+        <a:font script="Khmr" typeface="DaunPenh"/>
+        <a:font script="Knda" typeface="Tunga"/>
+        <a:font script="Guru" typeface="Raavi"/>
+        <a:font script="Cans" typeface="Euphemia"/>
+        <a:font script="Cher" typeface="Plantagenet Cherokee"/>
+        <a:font script="Yiii" typeface="Microsoft Yi Baiti"/>
+        <a:font script="Tibt" typeface="Microsoft Himalaya"/>
+        <a:font script="Thaa" typeface="MV Boli"/>
+        <a:font script="Deva" typeface="Mangal"/>
+        <a:font script="Telu" typeface="Gautami"/>
+        <a:font script="Taml" typeface="Latha"/>
+        <a:font script="Syrc" typeface="Estrangelo Edessa"/>
+        <a:font script="Orya" typeface="Kalinga"/>
+        <a:font script="Mlym" typeface="Kartika"/>
+        <a:font script="Laoo" typeface="DokChampa"/>
+        <a:font script="Sinh" typeface="Iskoola Pota"/>
+        <a:font script="Mong" typeface="Mongolian Baiti"/>
+        <a:font script="Viet" typeface="Arial"/>
+        <a:font script="Uigh" typeface="Microsoft Uighur"/>
+        <a:font script="Geor" typeface="Sylfaen"/>
+        <a:font script="Armn" typeface="Arial"/>
+        <a:font script="Bugi" typeface="Leelawadee UI"/>
+        <a:font script="Bopo" typeface="Microsoft JhengHei"/>
+        <a:font script="Java" typeface="Javanese Text"/>
+        <a:font script="Lisu" typeface="Segoe UI"/>
+        <a:font script="Mymr" typeface="Myanmar Text"/>
+        <a:font script="Nkoo" typeface="Ebrima"/>
+        <a:font script="Olck" typeface="Nirmala UI"/>
+        <a:font script="Osma" typeface="Ebrima"/>
+        <a:font script="Phag" typeface="Phagspa"/>
+        <a:font script="Syrn" typeface="Estrangelo Edessa"/>
+        <a:font script="Syrj" typeface="Estrangelo Edessa"/>
+        <a:font script="Syre" typeface="Estrangelo Edessa"/>
+        <a:font script="Sora" typeface="Nirmala UI"/>
+        <a:font script="Tale" typeface="Microsoft Tai Le"/>
+        <a:font script="Talu" typeface="Microsoft New Tai Lue"/>
+        <a:font script="Tfng" typeface="Ebrima"/>
+      </a:minorFont>
+    </a:fontScheme>
+    <a:fmtScheme name="Office">
+      <a:fillStyleLst>
+        <a:solidFill>
+          <a:schemeClr val="phClr"/>
+        </a:solidFill>
+        <a:gradFill rotWithShape="1">
+          <a:gsLst>
+            <a:gs pos="0">
+              <a:schemeClr val="phClr">
+                <a:lumMod val="110000"/>
+                <a:satMod val="105000"/>
+                <a:tint val="67000"/>
+              </a:schemeClr>
+            </a:gs>
+            <a:gs pos="50000">
+              <a:schemeClr val="phClr">
+                <a:lumMod val="105000"/>
+                <a:satMod val="103000"/>
+                <a:tint val="73000"/>
+              </a:schemeClr>
+            </a:gs>
+            <a:gs pos="100000">
+              <a:schemeClr val="phClr">
+                <a:lumMod val="105000"/>
+                <a:satMod val="109000"/>
+                <a:tint val="81000"/>
+              </a:schemeClr>
+            </a:gs>
+          </a:gsLst>
+          <a:lin ang="5400000" scaled="0"/>
+        </a:gradFill>
+        <a:gradFill rotWithShape="1">
+          <a:gsLst>
+            <a:gs pos="0">
+              <a:schemeClr val="phClr">
+                <a:satMod val="103000"/>
+                <a:lumMod val="102000"/>
+                <a:tint val="94000"/>
+              </a:schemeClr>
+            </a:gs>
+            <a:gs pos="50000">
+              <a:schemeClr val="phClr">
+                <a:satMod val="110000"/>
+                <a:lumMod val="100000"/>
+                <a:shade val="100000"/>
+              </a:schemeClr>
+            </a:gs>
+            <a:gs pos="100000">
+              <a:schemeClr val="phClr">
+                <a:lumMod val="99000"/>
+                <a:satMod val="120000"/>
+                <a:shade val="78000"/>
+              </a:schemeClr>
+            </a:gs>
+          </a:gsLst>
+          <a:lin ang="5400000" scaled="0"/>
+        </a:gradFill>
+      </a:fillStyleLst>
+      <a:lnStyleLst>
+        <a:ln w="6350" cap="flat" cmpd="sng" algn="ctr">
+          <a:solidFill>
+            <a:schemeClr val="phClr"/>
+          </a:solidFill>
+          <a:prstDash val="solid"/>
+          <a:miter lim="800000"/>
+        </a:ln>
+        <a:ln w="12700" cap="flat" cmpd="sng" algn="ctr">
+          <a:solidFill>
+            <a:schemeClr val="phClr"/>
+          </a:solidFill>
+          <a:prstDash val="solid"/>
+          <a:miter lim="800000"/>
+        </a:ln>
+        <a:ln w="19050" cap="flat" cmpd="sng" algn="ctr">
+          <a:solidFill>
+            <a:schemeClr val="phClr"/>
+          </a:solidFill>
+          <a:prstDash val="solid"/>
+          <a:miter lim="800000"/>
+        </a:ln>
+      </a:lnStyleLst>
+      <a:effectStyleLst>
+        <a:effectStyle>
+          <a:effectLst/>
+        </a:effectStyle>
+        <a:effectStyle>
+          <a:effectLst/>
+        </a:effectStyle>
+        <a:effectStyle>
+          <a:effectLst>
+            <a:outerShdw blurRad="57150" dist="19050" dir="5400000" algn="ctr" rotWithShape="0">
+              <a:srgbClr val="000000">
+                <a:alpha val="63000"/>
+              </a:srgbClr>
+            </a:outerShdw>
+          </a:effectLst>
+        </a:effectStyle>
+      </a:effectStyleLst>
+      <a:bgFillStyleLst>
+        <a:solidFill>
+          <a:schemeClr val="phClr"/>
+        </a:solidFill>
+        <a:solidFill>
+          <a:schemeClr val="phClr">
+            <a:tint val="95000"/>
+            <a:satMod val="170000"/>
+          </a:schemeClr>
+        </a:solidFill>
+        <a:gradFill rotWithShape="1">
+          <a:gsLst>
+            <a:gs pos="0">
+              <a:schemeClr val="phClr">
+                <a:tint val="93000"/>
+                <a:satMod val="150000"/>
+                <a:shade val="98000"/>
+                <a:lumMod val="102000"/>
+              </a:schemeClr>
+            </a:gs>
+            <a:gs pos="50000">
+              <a:schemeClr val="phClr">
+                <a:tint val="98000"/>
+                <a:satMod val="130000"/>
+                <a:shade val="90000"/>
+                <a:lumMod val="103000"/>
+              </a:schemeClr>
+            </a:gs>
+            <a:gs pos="100000">
+              <a:schemeClr val="phClr">
+                <a:shade val="63000"/>
+                <a:satMod val="120000"/>
+              </a:schemeClr>
+            </a:gs>
+          </a:gsLst>
+          <a:lin ang="5400000" scaled="0"/>
+        </a:gradFill>
+      </a:bgFillStyleLst>
+    </a:fmtScheme>
+  </a:themeElements>
+  <a:objectDefaults/>
+  <a:extraClrSchemeLst/>
+  <a:extLst>
+    <a:ext uri="{05A4C25C-085E-4340-85A3-A5531E510DB2}">
+      <thm15:themeFamily xmlns:thm15="http://schemas.microsoft.com/office/thememl/2012/main" name="Office Theme" id="{62F939B6-93AF-4DB8-9C6B-D6C7DFDC589F}" vid="{4A3C46E8-61CC-4603-A589-7422A47A8E4A}"/>
+    </a:ext>
+  </a:extLst>
+</a:theme>
 </file>
</xml_diff>